<commit_message>
updates based on reactions
</commit_message>
<xml_diff>
--- a/MoLOverviewPoster2019.pptx
+++ b/MoLOverviewPoster2019.pptx
@@ -193,7 +193,7 @@
           <a:p>
             <a:fld id="{B179243D-0E3E-4D4F-90E9-F9F1DBB34143}" type="datetimeFigureOut">
               <a:rPr lang="en-US" smtClean="0"/>
-              <a:t>5/10/19</a:t>
+              <a:t>5/13/19</a:t>
             </a:fld>
             <a:endParaRPr lang="en-US"/>
           </a:p>
@@ -2319,7 +2319,7 @@
           </a:ln>
           <a:extLst>
             <a:ext uri="{C572A759-6A51-4108-AA02-DFA0A04FC94B}">
-              <ma14:wrappingTextBoxFlag xmlns="" xmlns:ma14="http://schemas.microsoft.com/office/mac/drawingml/2011/main" val="1"/>
+              <ma14:wrappingTextBoxFlag xmlns:ma14="http://schemas.microsoft.com/office/mac/drawingml/2011/main" xmlns="" val="1"/>
             </a:ext>
           </a:extLst>
         </p:spPr>
@@ -2362,7 +2362,7 @@
           </a:ln>
           <a:extLst>
             <a:ext uri="{C572A759-6A51-4108-AA02-DFA0A04FC94B}">
-              <ma14:wrappingTextBoxFlag xmlns="" xmlns:ma14="http://schemas.microsoft.com/office/mac/drawingml/2011/main" val="1"/>
+              <ma14:wrappingTextBoxFlag xmlns:ma14="http://schemas.microsoft.com/office/mac/drawingml/2011/main" xmlns="" val="1"/>
             </a:ext>
           </a:extLst>
         </p:spPr>
@@ -3173,8 +3173,8 @@
         </p:nvSpPr>
         <p:spPr>
           <a:xfrm>
-            <a:off x="22795688" y="18225679"/>
-            <a:ext cx="11974143" cy="6011463"/>
+            <a:off x="22795689" y="18225679"/>
+            <a:ext cx="11541348" cy="6011463"/>
           </a:xfrm>
           <a:prstGeom prst="roundRect">
             <a:avLst>
@@ -3582,7 +3582,7 @@
           </a:ln>
           <a:extLst>
             <a:ext uri="{C572A759-6A51-4108-AA02-DFA0A04FC94B}">
-              <ma14:wrappingTextBoxFlag xmlns="" xmlns:ma14="http://schemas.microsoft.com/office/mac/drawingml/2011/main" val="1"/>
+              <ma14:wrappingTextBoxFlag xmlns:ma14="http://schemas.microsoft.com/office/mac/drawingml/2011/main" xmlns="" val="1"/>
             </a:ext>
           </a:extLst>
         </p:spPr>
@@ -3697,7 +3697,7 @@
           </a:ln>
           <a:extLst>
             <a:ext uri="{C572A759-6A51-4108-AA02-DFA0A04FC94B}">
-              <ma14:wrappingTextBoxFlag xmlns="" xmlns:ma14="http://schemas.microsoft.com/office/mac/drawingml/2011/main" val="1"/>
+              <ma14:wrappingTextBoxFlag xmlns:ma14="http://schemas.microsoft.com/office/mac/drawingml/2011/main" xmlns="" val="1"/>
             </a:ext>
           </a:extLst>
         </p:spPr>
@@ -3741,7 +3741,7 @@
           </a:ln>
           <a:extLst>
             <a:ext uri="{C572A759-6A51-4108-AA02-DFA0A04FC94B}">
-              <ma14:wrappingTextBoxFlag xmlns="" xmlns:ma14="http://schemas.microsoft.com/office/mac/drawingml/2011/main" val="1"/>
+              <ma14:wrappingTextBoxFlag xmlns:ma14="http://schemas.microsoft.com/office/mac/drawingml/2011/main" xmlns="" val="1"/>
             </a:ext>
           </a:extLst>
         </p:spPr>
@@ -3801,7 +3801,7 @@
           </a:ln>
           <a:extLst>
             <a:ext uri="{C572A759-6A51-4108-AA02-DFA0A04FC94B}">
-              <ma14:wrappingTextBoxFlag xmlns="" xmlns:ma14="http://schemas.microsoft.com/office/mac/drawingml/2011/main" val="1"/>
+              <ma14:wrappingTextBoxFlag xmlns:ma14="http://schemas.microsoft.com/office/mac/drawingml/2011/main" xmlns="" val="1"/>
             </a:ext>
           </a:extLst>
         </p:spPr>
@@ -4118,7 +4118,7 @@
               </a:ln>
               <a:extLst>
                 <a:ext uri="{C572A759-6A51-4108-AA02-DFA0A04FC94B}">
-                  <ma14:wrappingTextBoxFlag xmlns="" xmlns:ma14="http://schemas.microsoft.com/office/mac/drawingml/2011/main" val="1"/>
+                  <ma14:wrappingTextBoxFlag xmlns:ma14="http://schemas.microsoft.com/office/mac/drawingml/2011/main" xmlns="" val="1"/>
                 </a:ext>
               </a:extLst>
             </p:spPr>
@@ -4214,7 +4214,7 @@
           </a:ln>
           <a:extLst>
             <a:ext uri="{C572A759-6A51-4108-AA02-DFA0A04FC94B}">
-              <ma14:wrappingTextBoxFlag xmlns="" xmlns:ma14="http://schemas.microsoft.com/office/mac/drawingml/2011/main" val="1"/>
+              <ma14:wrappingTextBoxFlag xmlns:ma14="http://schemas.microsoft.com/office/mac/drawingml/2011/main" xmlns="" val="1"/>
             </a:ext>
           </a:extLst>
         </p:spPr>
@@ -4258,7 +4258,7 @@
           </a:ln>
           <a:extLst>
             <a:ext uri="{C572A759-6A51-4108-AA02-DFA0A04FC94B}">
-              <ma14:wrappingTextBoxFlag xmlns="" xmlns:ma14="http://schemas.microsoft.com/office/mac/drawingml/2011/main" val="1"/>
+              <ma14:wrappingTextBoxFlag xmlns:ma14="http://schemas.microsoft.com/office/mac/drawingml/2011/main" xmlns="" val="1"/>
             </a:ext>
           </a:extLst>
         </p:spPr>
@@ -4414,7 +4414,7 @@
             </a:ln>
             <a:extLst>
               <a:ext uri="{C572A759-6A51-4108-AA02-DFA0A04FC94B}">
-                <ma14:wrappingTextBoxFlag xmlns="" xmlns:ma14="http://schemas.microsoft.com/office/mac/drawingml/2011/main" val="1"/>
+                <ma14:wrappingTextBoxFlag xmlns:ma14="http://schemas.microsoft.com/office/mac/drawingml/2011/main" xmlns="" val="1"/>
               </a:ext>
             </a:extLst>
           </p:spPr>
@@ -4467,7 +4467,7 @@
           </a:ln>
           <a:extLst>
             <a:ext uri="{C572A759-6A51-4108-AA02-DFA0A04FC94B}">
-              <ma14:wrappingTextBoxFlag xmlns="" xmlns:ma14="http://schemas.microsoft.com/office/mac/drawingml/2011/main" val="1"/>
+              <ma14:wrappingTextBoxFlag xmlns:ma14="http://schemas.microsoft.com/office/mac/drawingml/2011/main" xmlns="" val="1"/>
             </a:ext>
           </a:extLst>
         </p:spPr>
@@ -4920,105 +4920,6 @@
       </p:sp>
       <p:sp>
         <p:nvSpPr>
-          <p:cNvPr id="166" name="Shape 166"/>
-          <p:cNvSpPr/>
-          <p:nvPr/>
-        </p:nvSpPr>
-        <p:spPr>
-          <a:xfrm>
-            <a:off x="30622761" y="13216708"/>
-            <a:ext cx="3276000" cy="2430000"/>
-          </a:xfrm>
-          <a:prstGeom prst="roundRect">
-            <a:avLst>
-              <a:gd name="adj" fmla="val 16667"/>
-            </a:avLst>
-          </a:prstGeom>
-          <a:ln>
-            <a:noFill/>
-          </a:ln>
-        </p:spPr>
-        <p:style>
-          <a:lnRef idx="1">
-            <a:schemeClr val="dk1"/>
-          </a:lnRef>
-          <a:fillRef idx="2">
-            <a:schemeClr val="dk1"/>
-          </a:fillRef>
-          <a:effectRef idx="1">
-            <a:schemeClr val="dk1"/>
-          </a:effectRef>
-          <a:fontRef idx="minor">
-            <a:schemeClr val="dk1"/>
-          </a:fontRef>
-        </p:style>
-        <p:txBody>
-          <a:bodyPr wrap="square" lIns="0" tIns="0" rIns="0" bIns="0" numCol="1" anchor="ctr">
-            <a:noAutofit/>
-          </a:bodyPr>
-          <a:lstStyle/>
-          <a:p>
-            <a:pPr algn="ctr"/>
-            <a:r>
-              <a:rPr lang="en-US" sz="2900" dirty="0">
-                <a:solidFill>
-                  <a:schemeClr val="dk1">
-                    <a:alpha val="25000"/>
-                  </a:schemeClr>
-                </a:solidFill>
-                <a:latin typeface="Calibri" charset="0"/>
-                <a:ea typeface="+mn-ea"/>
-                <a:cs typeface="Calibri" charset="0"/>
-              </a:rPr>
-              <a:t>[</a:t>
-            </a:r>
-            <a:r>
-              <a:rPr lang="en-US" sz="2900" dirty="0" err="1">
-                <a:solidFill>
-                  <a:schemeClr val="dk1">
-                    <a:alpha val="25000"/>
-                  </a:schemeClr>
-                </a:solidFill>
-                <a:latin typeface="Calibri" charset="0"/>
-                <a:ea typeface="+mn-ea"/>
-                <a:cs typeface="Calibri" charset="0"/>
-              </a:rPr>
-              <a:t>MScB&amp;CS</a:t>
-            </a:r>
-            <a:r>
-              <a:rPr lang="en-US" sz="2900" dirty="0">
-                <a:solidFill>
-                  <a:schemeClr val="dk1">
-                    <a:alpha val="25000"/>
-                  </a:schemeClr>
-                </a:solidFill>
-                <a:latin typeface="Calibri" charset="0"/>
-                <a:ea typeface="+mn-ea"/>
-                <a:cs typeface="Calibri" charset="0"/>
-              </a:rPr>
-              <a:t>] Cognitive Models of Language and Music </a:t>
-            </a:r>
-          </a:p>
-          <a:p>
-            <a:pPr algn="ctr"/>
-            <a:r>
-              <a:rPr lang="en-US" sz="2900" dirty="0">
-                <a:solidFill>
-                  <a:schemeClr val="dk1">
-                    <a:alpha val="25000"/>
-                  </a:schemeClr>
-                </a:solidFill>
-                <a:latin typeface="Calibri" charset="0"/>
-                <a:ea typeface="+mn-ea"/>
-                <a:cs typeface="Calibri" charset="0"/>
-              </a:rPr>
-              <a:t>(Lentz)</a:t>
-            </a:r>
-          </a:p>
-        </p:txBody>
-      </p:sp>
-      <p:sp>
-        <p:nvSpPr>
           <p:cNvPr id="208" name="Shape 208"/>
           <p:cNvSpPr/>
           <p:nvPr/>
@@ -5101,7 +5002,7 @@
         </p:nvSpPr>
         <p:spPr>
           <a:xfrm>
-            <a:off x="27064299" y="13217962"/>
+            <a:off x="30543454" y="13217962"/>
             <a:ext cx="3276000" cy="2430000"/>
           </a:xfrm>
           <a:prstGeom prst="roundRect">
@@ -5396,15 +5297,7 @@
             </a:r>
             <a:r>
               <a:rPr lang="en-US" sz="2900" dirty="0" err="1"/>
-              <a:t>Zuidema</a:t>
-            </a:r>
-            <a:r>
-              <a:rPr lang="en-US" sz="2900" dirty="0"/>
-              <a:t>, </a:t>
-            </a:r>
-            <a:r>
-              <a:rPr lang="en-US" sz="2900" dirty="0" err="1"/>
-              <a:t>coord</a:t>
+              <a:t>Sima’an</a:t>
             </a:r>
             <a:r>
               <a:rPr lang="en-US" sz="2900" dirty="0"/>
@@ -6946,10 +6839,10 @@
         </p:nvGrpSpPr>
         <p:grpSpPr>
           <a:xfrm>
-            <a:off x="38653123" y="24231279"/>
-            <a:ext cx="3276000" cy="2609466"/>
-            <a:chOff x="35156122" y="21757557"/>
-            <a:chExt cx="3632244" cy="2609466"/>
+            <a:off x="38653123" y="24164373"/>
+            <a:ext cx="3276000" cy="2676372"/>
+            <a:chOff x="35156122" y="21690651"/>
+            <a:chExt cx="3632244" cy="2676372"/>
           </a:xfrm>
         </p:grpSpPr>
         <p:sp>
@@ -7035,7 +6928,7 @@
           </p:nvSpPr>
           <p:spPr>
             <a:xfrm>
-              <a:off x="36161721" y="21757557"/>
+              <a:off x="36161721" y="21690651"/>
               <a:ext cx="1497972" cy="1204325"/>
             </a:xfrm>
             <a:prstGeom prst="rect">
@@ -7046,7 +6939,7 @@
             </a:ln>
             <a:extLst>
               <a:ext uri="{C572A759-6A51-4108-AA02-DFA0A04FC94B}">
-                <ma14:wrappingTextBoxFlag xmlns="" xmlns:ma14="http://schemas.microsoft.com/office/mac/drawingml/2011/main" val="1"/>
+                <ma14:wrappingTextBoxFlag xmlns:ma14="http://schemas.microsoft.com/office/mac/drawingml/2011/main" xmlns="" val="1"/>
               </a:ext>
             </a:extLst>
           </p:spPr>
@@ -7080,10 +6973,10 @@
         </p:nvGrpSpPr>
         <p:grpSpPr>
           <a:xfrm>
-            <a:off x="34854395" y="24097082"/>
-            <a:ext cx="3276000" cy="2748468"/>
-            <a:chOff x="43340423" y="30726529"/>
-            <a:chExt cx="3479308" cy="2748468"/>
+            <a:off x="34854395" y="24141686"/>
+            <a:ext cx="3276000" cy="2703864"/>
+            <a:chOff x="43340423" y="30771133"/>
+            <a:chExt cx="3479308" cy="2703864"/>
           </a:xfrm>
         </p:grpSpPr>
         <p:sp>
@@ -7235,7 +7128,7 @@
           </p:nvSpPr>
           <p:spPr>
             <a:xfrm>
-              <a:off x="44088010" y="30726529"/>
+              <a:off x="44253813" y="30771133"/>
               <a:ext cx="1497972" cy="1204325"/>
             </a:xfrm>
             <a:prstGeom prst="rect">
@@ -7246,7 +7139,7 @@
             </a:ln>
             <a:extLst>
               <a:ext uri="{C572A759-6A51-4108-AA02-DFA0A04FC94B}">
-                <ma14:wrappingTextBoxFlag xmlns="" xmlns:ma14="http://schemas.microsoft.com/office/mac/drawingml/2011/main" val="1"/>
+                <ma14:wrappingTextBoxFlag xmlns:ma14="http://schemas.microsoft.com/office/mac/drawingml/2011/main" xmlns="" val="1"/>
               </a:ext>
             </a:extLst>
           </p:spPr>
@@ -7964,7 +7857,7 @@
             </a:ln>
             <a:extLst>
               <a:ext uri="{C572A759-6A51-4108-AA02-DFA0A04FC94B}">
-                <ma14:wrappingTextBoxFlag xmlns="" xmlns:ma14="http://schemas.microsoft.com/office/mac/drawingml/2011/main" val="1"/>
+                <ma14:wrappingTextBoxFlag xmlns:ma14="http://schemas.microsoft.com/office/mac/drawingml/2011/main" xmlns="" val="1"/>
               </a:ext>
             </a:extLst>
           </p:spPr>
@@ -8130,7 +8023,7 @@
             </a:ln>
             <a:extLst>
               <a:ext uri="{C572A759-6A51-4108-AA02-DFA0A04FC94B}">
-                <ma14:wrappingTextBoxFlag xmlns="" xmlns:ma14="http://schemas.microsoft.com/office/mac/drawingml/2011/main" val="1"/>
+                <ma14:wrappingTextBoxFlag xmlns:ma14="http://schemas.microsoft.com/office/mac/drawingml/2011/main" xmlns="" val="1"/>
               </a:ext>
             </a:extLst>
           </p:spPr>
@@ -8169,7 +8062,7 @@
           </a:ln>
           <a:extLst>
             <a:ext uri="{C572A759-6A51-4108-AA02-DFA0A04FC94B}">
-              <ma14:wrappingTextBoxFlag xmlns="" xmlns:ma14="http://schemas.microsoft.com/office/mac/drawingml/2011/main" val="1"/>
+              <ma14:wrappingTextBoxFlag xmlns:ma14="http://schemas.microsoft.com/office/mac/drawingml/2011/main" xmlns="" val="1"/>
             </a:ext>
           </a:extLst>
         </p:spPr>
@@ -8698,7 +8591,7 @@
             </a:ln>
             <a:extLst>
               <a:ext uri="{C572A759-6A51-4108-AA02-DFA0A04FC94B}">
-                <ma14:wrappingTextBoxFlag xmlns="" xmlns:ma14="http://schemas.microsoft.com/office/mac/drawingml/2011/main" val="1"/>
+                <ma14:wrappingTextBoxFlag xmlns:ma14="http://schemas.microsoft.com/office/mac/drawingml/2011/main" xmlns="" val="1"/>
               </a:ext>
             </a:extLst>
           </p:spPr>
@@ -9054,7 +8947,7 @@
               </a:ln>
               <a:extLst>
                 <a:ext uri="{C572A759-6A51-4108-AA02-DFA0A04FC94B}">
-                  <ma14:wrappingTextBoxFlag xmlns="" xmlns:ma14="http://schemas.microsoft.com/office/mac/drawingml/2011/main" val="1"/>
+                  <ma14:wrappingTextBoxFlag xmlns:ma14="http://schemas.microsoft.com/office/mac/drawingml/2011/main" xmlns="" val="1"/>
                 </a:ext>
               </a:extLst>
             </p:spPr>
@@ -9258,21 +9151,18 @@
               <a:t>(</a:t>
             </a:r>
             <a:r>
-              <a:rPr lang="en-US" sz="2900" dirty="0" err="1">
+              <a:rPr lang="en-US" sz="2900">
                 <a:solidFill>
                   <a:schemeClr val="tx1"/>
                 </a:solidFill>
               </a:rPr>
-              <a:t>Hengeveld</a:t>
-            </a:r>
-            <a:r>
-              <a:rPr lang="en-US" sz="2900" dirty="0">
-                <a:solidFill>
-                  <a:schemeClr val="tx1"/>
-                </a:solidFill>
-              </a:rPr>
-              <a:t>)</a:t>
-            </a:r>
+              <a:t>Ruijgrok)</a:t>
+            </a:r>
+            <a:endParaRPr lang="en-US" sz="2900" dirty="0">
+              <a:solidFill>
+                <a:schemeClr val="tx1"/>
+              </a:solidFill>
+            </a:endParaRPr>
           </a:p>
         </p:txBody>
       </p:sp>
@@ -9345,7 +9235,7 @@
             </a:r>
             <a:r>
               <a:rPr lang="en-US" sz="2900" dirty="0" err="1"/>
-              <a:t>Aboh</a:t>
+              <a:t>Rijgrok</a:t>
             </a:r>
             <a:r>
               <a:rPr lang="en-US" sz="2900" dirty="0"/>
@@ -9373,7 +9263,7 @@
           </a:ln>
           <a:extLst>
             <a:ext uri="{C572A759-6A51-4108-AA02-DFA0A04FC94B}">
-              <ma14:wrappingTextBoxFlag xmlns="" xmlns:ma14="http://schemas.microsoft.com/office/mac/drawingml/2011/main" val="1"/>
+              <ma14:wrappingTextBoxFlag xmlns:ma14="http://schemas.microsoft.com/office/mac/drawingml/2011/main" xmlns="" val="1"/>
             </a:ext>
           </a:extLst>
         </p:spPr>
@@ -9467,7 +9357,7 @@
           </a:ln>
           <a:extLst>
             <a:ext uri="{C572A759-6A51-4108-AA02-DFA0A04FC94B}">
-              <ma14:wrappingTextBoxFlag xmlns="" xmlns:ma14="http://schemas.microsoft.com/office/mac/drawingml/2011/main" val="1"/>
+              <ma14:wrappingTextBoxFlag xmlns:ma14="http://schemas.microsoft.com/office/mac/drawingml/2011/main" xmlns="" val="1"/>
             </a:ext>
           </a:extLst>
         </p:spPr>
@@ -9514,7 +9404,7 @@
         </p:nvSpPr>
         <p:spPr>
           <a:xfrm>
-            <a:off x="27053493" y="18726962"/>
+            <a:off x="27064299" y="18726962"/>
             <a:ext cx="3276000" cy="2430000"/>
           </a:xfrm>
           <a:prstGeom prst="roundRect">
@@ -9894,7 +9784,7 @@
           </a:ln>
           <a:extLst>
             <a:ext uri="{C572A759-6A51-4108-AA02-DFA0A04FC94B}">
-              <ma14:wrappingTextBoxFlag xmlns="" xmlns:ma14="http://schemas.microsoft.com/office/mac/drawingml/2011/main" val="1"/>
+              <ma14:wrappingTextBoxFlag xmlns:ma14="http://schemas.microsoft.com/office/mac/drawingml/2011/main" xmlns="" val="1"/>
             </a:ext>
           </a:extLst>
         </p:spPr>
@@ -9946,7 +9836,7 @@
           </a:ln>
           <a:extLst>
             <a:ext uri="{C572A759-6A51-4108-AA02-DFA0A04FC94B}">
-              <ma14:wrappingTextBoxFlag xmlns="" xmlns:ma14="http://schemas.microsoft.com/office/mac/drawingml/2011/main" val="1"/>
+              <ma14:wrappingTextBoxFlag xmlns:ma14="http://schemas.microsoft.com/office/mac/drawingml/2011/main" xmlns="" val="1"/>
             </a:ext>
           </a:extLst>
         </p:spPr>
@@ -10262,35 +10152,22 @@
               <a:gd name="adj" fmla="val 16667"/>
             </a:avLst>
           </a:prstGeom>
-          <a:gradFill flip="none" rotWithShape="1">
-            <a:gsLst>
-              <a:gs pos="0">
-                <a:srgbClr val="FFD1BB"/>
-              </a:gs>
-              <a:gs pos="35000">
-                <a:srgbClr val="FFDECF"/>
-              </a:gs>
-              <a:gs pos="100000">
-                <a:srgbClr val="FFF2ED"/>
-              </a:gs>
-            </a:gsLst>
-            <a:lin ang="16200000" scaled="0"/>
-          </a:gradFill>
-          <a:ln w="9525" cap="flat">
-            <a:solidFill>
-              <a:srgbClr val="F69240"/>
-            </a:solidFill>
-            <a:prstDash val="solid"/>
-            <a:bevel/>
-          </a:ln>
-          <a:effectLst>
-            <a:outerShdw blurRad="38100" dist="20000" dir="5400000" rotWithShape="0">
-              <a:srgbClr val="000000">
-                <a:alpha val="38000"/>
-              </a:srgbClr>
-            </a:outerShdw>
-          </a:effectLst>
+          <a:ln/>
         </p:spPr>
+        <p:style>
+          <a:lnRef idx="1">
+            <a:schemeClr val="accent4"/>
+          </a:lnRef>
+          <a:fillRef idx="2">
+            <a:schemeClr val="accent4"/>
+          </a:fillRef>
+          <a:effectRef idx="1">
+            <a:schemeClr val="accent4"/>
+          </a:effectRef>
+          <a:fontRef idx="minor">
+            <a:schemeClr val="dk1"/>
+          </a:fontRef>
+        </p:style>
         <p:txBody>
           <a:bodyPr wrap="square" lIns="0" tIns="0" rIns="0" bIns="0" numCol="1" anchor="ctr">
             <a:noAutofit/>
@@ -10299,37 +10176,100 @@
           <a:p>
             <a:pPr algn="ctr"/>
             <a:r>
-              <a:rPr lang="en-US" sz="2900" dirty="0"/>
+              <a:rPr lang="en-US" sz="2900" dirty="0">
+                <a:solidFill>
+                  <a:schemeClr val="dk1"/>
+                </a:solidFill>
+                <a:latin typeface="+mn-lt"/>
+                <a:ea typeface="+mn-ea"/>
+                <a:cs typeface="+mn-cs"/>
+              </a:rPr>
               <a:t>[</a:t>
             </a:r>
             <a:r>
-              <a:rPr lang="en-US" sz="2900" dirty="0" err="1"/>
+              <a:rPr lang="en-US" sz="2900" dirty="0" err="1">
+                <a:solidFill>
+                  <a:schemeClr val="dk1"/>
+                </a:solidFill>
+                <a:latin typeface="+mn-lt"/>
+                <a:ea typeface="+mn-ea"/>
+                <a:cs typeface="+mn-cs"/>
+              </a:rPr>
               <a:t>MScCS</a:t>
             </a:r>
             <a:r>
-              <a:rPr lang="en-US" sz="2900" dirty="0"/>
+              <a:rPr lang="en-US" sz="2900" dirty="0">
+                <a:solidFill>
+                  <a:schemeClr val="dk1"/>
+                </a:solidFill>
+                <a:latin typeface="+mn-lt"/>
+                <a:ea typeface="+mn-ea"/>
+                <a:cs typeface="+mn-cs"/>
+              </a:rPr>
               <a:t>-VU]</a:t>
             </a:r>
             <a:br>
-              <a:rPr lang="en-US" sz="2900" dirty="0"/>
+              <a:rPr lang="en-US" sz="2900" dirty="0">
+                <a:solidFill>
+                  <a:schemeClr val="dk1"/>
+                </a:solidFill>
+                <a:latin typeface="+mn-lt"/>
+                <a:ea typeface="+mn-ea"/>
+                <a:cs typeface="+mn-cs"/>
+              </a:rPr>
             </a:br>
             <a:r>
-              <a:rPr lang="en-US" sz="2900" dirty="0"/>
+              <a:rPr lang="en-US" sz="2900" dirty="0">
+                <a:solidFill>
+                  <a:schemeClr val="dk1"/>
+                </a:solidFill>
+                <a:latin typeface="+mn-lt"/>
+                <a:ea typeface="+mn-ea"/>
+                <a:cs typeface="+mn-cs"/>
+              </a:rPr>
               <a:t>Term Rewriting Systems</a:t>
             </a:r>
             <a:br>
-              <a:rPr lang="en-US" sz="2900" dirty="0"/>
+              <a:rPr lang="en-US" sz="2900" dirty="0">
+                <a:solidFill>
+                  <a:schemeClr val="dk1"/>
+                </a:solidFill>
+                <a:latin typeface="+mn-lt"/>
+                <a:ea typeface="+mn-ea"/>
+                <a:cs typeface="+mn-cs"/>
+              </a:rPr>
             </a:br>
             <a:r>
-              <a:rPr lang="en-US" sz="2900" dirty="0"/>
+              <a:rPr lang="en-US" sz="2900" dirty="0">
+                <a:solidFill>
+                  <a:schemeClr val="dk1"/>
+                </a:solidFill>
+                <a:latin typeface="+mn-lt"/>
+                <a:ea typeface="+mn-ea"/>
+                <a:cs typeface="+mn-cs"/>
+              </a:rPr>
               <a:t>(</a:t>
             </a:r>
             <a:r>
-              <a:rPr lang="en-US" sz="2900" dirty="0" err="1"/>
+              <a:rPr lang="en-US" sz="2900" dirty="0" err="1">
+                <a:solidFill>
+                  <a:schemeClr val="dk1"/>
+                </a:solidFill>
+                <a:latin typeface="+mn-lt"/>
+                <a:ea typeface="+mn-ea"/>
+                <a:cs typeface="+mn-cs"/>
+              </a:rPr>
               <a:t>Endrullis</a:t>
             </a:r>
             <a:r>
-              <a:rPr lang="en-US" sz="2900" dirty="0"/>
+              <a:rPr lang="en-US" sz="2900" dirty="0">
+                <a:solidFill>
+                  <a:schemeClr val="dk1"/>
+                </a:solidFill>
+                <a:latin typeface="+mn-lt"/>
+                <a:ea typeface="+mn-ea"/>
+                <a:cs typeface="+mn-cs"/>
+              </a:rPr>
               <a:t>)</a:t>
             </a:r>
           </a:p>
@@ -10874,7 +10814,7 @@
           </a:ln>
           <a:extLst>
             <a:ext uri="{C572A759-6A51-4108-AA02-DFA0A04FC94B}">
-              <ma14:wrappingTextBoxFlag xmlns="" xmlns:ma14="http://schemas.microsoft.com/office/mac/drawingml/2011/main" val="1"/>
+              <ma14:wrappingTextBoxFlag xmlns:ma14="http://schemas.microsoft.com/office/mac/drawingml/2011/main" xmlns="" val="1"/>
             </a:ext>
           </a:extLst>
         </p:spPr>
@@ -11017,7 +10957,7 @@
                 <a:ea typeface="Calibri"/>
                 <a:cs typeface="Calibri"/>
               </a:rPr>
-              <a:t>version: 10 May 2019:</a:t>
+              <a:t>version: 13 May 2019:</a:t>
             </a:r>
             <a:br>
               <a:rPr lang="en-US" sz="2800" dirty="0">
@@ -11363,7 +11303,7 @@
           </a:ln>
           <a:extLst>
             <a:ext uri="{C572A759-6A51-4108-AA02-DFA0A04FC94B}">
-              <ma14:wrappingTextBoxFlag xmlns="" xmlns:ma14="http://schemas.microsoft.com/office/mac/drawingml/2011/main" val="1"/>
+              <ma14:wrappingTextBoxFlag xmlns:ma14="http://schemas.microsoft.com/office/mac/drawingml/2011/main" xmlns="" val="1"/>
             </a:ext>
           </a:extLst>
         </p:spPr>
@@ -11383,14 +11323,14 @@
             <a:r>
               <a:rPr lang="en-US" sz="3300" b="1" dirty="0">
                 <a:solidFill>
-                  <a:schemeClr val="tx1"/>
+                  <a:schemeClr val="bg1"/>
                 </a:solidFill>
               </a:rPr>
               <a:t>L&amp;M</a:t>
             </a:r>
             <a:endParaRPr sz="3300" b="1" dirty="0">
               <a:solidFill>
-                <a:schemeClr val="tx1"/>
+                <a:schemeClr val="bg1"/>
               </a:solidFill>
             </a:endParaRPr>
           </a:p>
@@ -11813,6 +11753,108 @@
               </a:defRPr>
             </a:pPr>
             <a:endParaRPr/>
+          </a:p>
+        </p:txBody>
+      </p:sp>
+      <p:sp>
+        <p:nvSpPr>
+          <p:cNvPr id="164" name="Shape 211">
+            <a:extLst>
+              <a:ext uri="{FF2B5EF4-FFF2-40B4-BE49-F238E27FC236}">
+                <a16:creationId xmlns:a16="http://schemas.microsoft.com/office/drawing/2014/main" id="{7123FEA1-E2EA-4240-B92F-3B82BDD7A6B9}"/>
+              </a:ext>
+            </a:extLst>
+          </p:cNvPr>
+          <p:cNvSpPr/>
+          <p:nvPr/>
+        </p:nvSpPr>
+        <p:spPr>
+          <a:xfrm>
+            <a:off x="34550258" y="18726962"/>
+            <a:ext cx="3276000" cy="2430000"/>
+          </a:xfrm>
+          <a:prstGeom prst="roundRect">
+            <a:avLst>
+              <a:gd name="adj" fmla="val 16667"/>
+            </a:avLst>
+          </a:prstGeom>
+          <a:gradFill flip="none" rotWithShape="1">
+            <a:gsLst>
+              <a:gs pos="0">
+                <a:srgbClr val="FFD1BB"/>
+              </a:gs>
+              <a:gs pos="35000">
+                <a:srgbClr val="FFDECF"/>
+              </a:gs>
+              <a:gs pos="100000">
+                <a:srgbClr val="FFF2ED"/>
+              </a:gs>
+            </a:gsLst>
+            <a:lin ang="16200000" scaled="0"/>
+          </a:gradFill>
+          <a:ln w="9525" cap="flat">
+            <a:solidFill>
+              <a:srgbClr val="F69240"/>
+            </a:solidFill>
+            <a:prstDash val="solid"/>
+            <a:bevel/>
+          </a:ln>
+          <a:effectLst>
+            <a:outerShdw blurRad="38100" dist="20000" dir="5400000" rotWithShape="0">
+              <a:srgbClr val="000000">
+                <a:alpha val="38000"/>
+              </a:srgbClr>
+            </a:outerShdw>
+          </a:effectLst>
+        </p:spPr>
+        <p:txBody>
+          <a:bodyPr wrap="square" lIns="0" tIns="0" rIns="0" bIns="0" numCol="1" anchor="ctr">
+            <a:noAutofit/>
+          </a:bodyPr>
+          <a:lstStyle/>
+          <a:p>
+            <a:pPr algn="ctr"/>
+            <a:r>
+              <a:rPr lang="en-US" sz="2900" dirty="0">
+                <a:latin typeface="Calibri"/>
+                <a:cs typeface="Calibri"/>
+              </a:rPr>
+              <a:t>[</a:t>
+            </a:r>
+            <a:r>
+              <a:rPr lang="en-US" sz="2900" dirty="0" err="1">
+                <a:latin typeface="Calibri"/>
+                <a:cs typeface="Calibri"/>
+              </a:rPr>
+              <a:t>MoL</a:t>
+            </a:r>
+            <a:r>
+              <a:rPr lang="en-US" sz="2900" dirty="0">
+                <a:latin typeface="Calibri"/>
+                <a:cs typeface="Calibri"/>
+              </a:rPr>
+              <a:t>-FNWI]</a:t>
+            </a:r>
+          </a:p>
+          <a:p>
+            <a:pPr algn="ctr"/>
+            <a:r>
+              <a:rPr lang="en-US" sz="2900" dirty="0">
+                <a:latin typeface="Calibri"/>
+                <a:cs typeface="Calibri"/>
+              </a:rPr>
+              <a:t>Symbolic Systems 1</a:t>
+            </a:r>
+          </a:p>
+          <a:p>
+            <a:pPr algn="ctr"/>
+            <a:r>
+              <a:rPr lang="en-US" sz="2900" dirty="0">
+                <a:latin typeface="Calibri"/>
+                <a:cs typeface="Calibri"/>
+              </a:rPr>
+              <a:t>(TBA)</a:t>
+            </a:r>
           </a:p>
         </p:txBody>
       </p:sp>

</xml_diff>

<commit_message>
quantum courses next to each other
</commit_message>
<xml_diff>
--- a/MoLOverviewPoster2019.pptx
+++ b/MoLOverviewPoster2019.pptx
@@ -2319,7 +2319,7 @@
           </a:ln>
           <a:extLst>
             <a:ext uri="{C572A759-6A51-4108-AA02-DFA0A04FC94B}">
-              <ma14:wrappingTextBoxFlag xmlns:ma14="http://schemas.microsoft.com/office/mac/drawingml/2011/main" xmlns="" val="1"/>
+              <ma14:wrappingTextBoxFlag xmlns="" xmlns:ma14="http://schemas.microsoft.com/office/mac/drawingml/2011/main" val="1"/>
             </a:ext>
           </a:extLst>
         </p:spPr>
@@ -2362,7 +2362,7 @@
           </a:ln>
           <a:extLst>
             <a:ext uri="{C572A759-6A51-4108-AA02-DFA0A04FC94B}">
-              <ma14:wrappingTextBoxFlag xmlns:ma14="http://schemas.microsoft.com/office/mac/drawingml/2011/main" xmlns="" val="1"/>
+              <ma14:wrappingTextBoxFlag xmlns="" xmlns:ma14="http://schemas.microsoft.com/office/mac/drawingml/2011/main" val="1"/>
             </a:ext>
           </a:extLst>
         </p:spPr>
@@ -3582,7 +3582,7 @@
           </a:ln>
           <a:extLst>
             <a:ext uri="{C572A759-6A51-4108-AA02-DFA0A04FC94B}">
-              <ma14:wrappingTextBoxFlag xmlns:ma14="http://schemas.microsoft.com/office/mac/drawingml/2011/main" xmlns="" val="1"/>
+              <ma14:wrappingTextBoxFlag xmlns="" xmlns:ma14="http://schemas.microsoft.com/office/mac/drawingml/2011/main" val="1"/>
             </a:ext>
           </a:extLst>
         </p:spPr>
@@ -3697,7 +3697,7 @@
           </a:ln>
           <a:extLst>
             <a:ext uri="{C572A759-6A51-4108-AA02-DFA0A04FC94B}">
-              <ma14:wrappingTextBoxFlag xmlns:ma14="http://schemas.microsoft.com/office/mac/drawingml/2011/main" xmlns="" val="1"/>
+              <ma14:wrappingTextBoxFlag xmlns="" xmlns:ma14="http://schemas.microsoft.com/office/mac/drawingml/2011/main" val="1"/>
             </a:ext>
           </a:extLst>
         </p:spPr>
@@ -3741,7 +3741,7 @@
           </a:ln>
           <a:extLst>
             <a:ext uri="{C572A759-6A51-4108-AA02-DFA0A04FC94B}">
-              <ma14:wrappingTextBoxFlag xmlns:ma14="http://schemas.microsoft.com/office/mac/drawingml/2011/main" xmlns="" val="1"/>
+              <ma14:wrappingTextBoxFlag xmlns="" xmlns:ma14="http://schemas.microsoft.com/office/mac/drawingml/2011/main" val="1"/>
             </a:ext>
           </a:extLst>
         </p:spPr>
@@ -3801,7 +3801,7 @@
           </a:ln>
           <a:extLst>
             <a:ext uri="{C572A759-6A51-4108-AA02-DFA0A04FC94B}">
-              <ma14:wrappingTextBoxFlag xmlns:ma14="http://schemas.microsoft.com/office/mac/drawingml/2011/main" xmlns="" val="1"/>
+              <ma14:wrappingTextBoxFlag xmlns="" xmlns:ma14="http://schemas.microsoft.com/office/mac/drawingml/2011/main" val="1"/>
             </a:ext>
           </a:extLst>
         </p:spPr>
@@ -4118,7 +4118,7 @@
               </a:ln>
               <a:extLst>
                 <a:ext uri="{C572A759-6A51-4108-AA02-DFA0A04FC94B}">
-                  <ma14:wrappingTextBoxFlag xmlns:ma14="http://schemas.microsoft.com/office/mac/drawingml/2011/main" xmlns="" val="1"/>
+                  <ma14:wrappingTextBoxFlag xmlns="" xmlns:ma14="http://schemas.microsoft.com/office/mac/drawingml/2011/main" val="1"/>
                 </a:ext>
               </a:extLst>
             </p:spPr>
@@ -4214,7 +4214,7 @@
           </a:ln>
           <a:extLst>
             <a:ext uri="{C572A759-6A51-4108-AA02-DFA0A04FC94B}">
-              <ma14:wrappingTextBoxFlag xmlns:ma14="http://schemas.microsoft.com/office/mac/drawingml/2011/main" xmlns="" val="1"/>
+              <ma14:wrappingTextBoxFlag xmlns="" xmlns:ma14="http://schemas.microsoft.com/office/mac/drawingml/2011/main" val="1"/>
             </a:ext>
           </a:extLst>
         </p:spPr>
@@ -4258,7 +4258,7 @@
           </a:ln>
           <a:extLst>
             <a:ext uri="{C572A759-6A51-4108-AA02-DFA0A04FC94B}">
-              <ma14:wrappingTextBoxFlag xmlns:ma14="http://schemas.microsoft.com/office/mac/drawingml/2011/main" xmlns="" val="1"/>
+              <ma14:wrappingTextBoxFlag xmlns="" xmlns:ma14="http://schemas.microsoft.com/office/mac/drawingml/2011/main" val="1"/>
             </a:ext>
           </a:extLst>
         </p:spPr>
@@ -4414,7 +4414,7 @@
             </a:ln>
             <a:extLst>
               <a:ext uri="{C572A759-6A51-4108-AA02-DFA0A04FC94B}">
-                <ma14:wrappingTextBoxFlag xmlns:ma14="http://schemas.microsoft.com/office/mac/drawingml/2011/main" xmlns="" val="1"/>
+                <ma14:wrappingTextBoxFlag xmlns="" xmlns:ma14="http://schemas.microsoft.com/office/mac/drawingml/2011/main" val="1"/>
               </a:ext>
             </a:extLst>
           </p:spPr>
@@ -4467,7 +4467,7 @@
           </a:ln>
           <a:extLst>
             <a:ext uri="{C572A759-6A51-4108-AA02-DFA0A04FC94B}">
-              <ma14:wrappingTextBoxFlag xmlns:ma14="http://schemas.microsoft.com/office/mac/drawingml/2011/main" xmlns="" val="1"/>
+              <ma14:wrappingTextBoxFlag xmlns="" xmlns:ma14="http://schemas.microsoft.com/office/mac/drawingml/2011/main" val="1"/>
             </a:ext>
           </a:extLst>
         </p:spPr>
@@ -6585,7 +6585,11 @@
             </a:r>
             <a:r>
               <a:rPr lang="en-US" sz="2900" dirty="0"/>
-              <a:t>] Quantum computing </a:t>
+              <a:t>] </a:t>
+            </a:r>
+            <a:r>
+              <a:rPr lang="en-US" sz="2900"/>
+              <a:t>Quantum Computing </a:t>
             </a:r>
             <a:br>
               <a:rPr lang="en-US" sz="2900" dirty="0"/>
@@ -6741,7 +6745,7 @@
         </p:nvSpPr>
         <p:spPr>
           <a:xfrm>
-            <a:off x="31091852" y="24410745"/>
+            <a:off x="31091852" y="27173194"/>
             <a:ext cx="3276000" cy="2430000"/>
           </a:xfrm>
           <a:prstGeom prst="roundRect">
@@ -6793,7 +6797,7 @@
             </a:r>
             <a:r>
               <a:rPr lang="en-US" sz="2900" dirty="0" err="1"/>
-              <a:t>MastMath</a:t>
+              <a:t>MastMath-UvA</a:t>
             </a:r>
             <a:r>
               <a:rPr lang="en-US" sz="2900" dirty="0"/>
@@ -6939,7 +6943,7 @@
             </a:ln>
             <a:extLst>
               <a:ext uri="{C572A759-6A51-4108-AA02-DFA0A04FC94B}">
-                <ma14:wrappingTextBoxFlag xmlns:ma14="http://schemas.microsoft.com/office/mac/drawingml/2011/main" xmlns="" val="1"/>
+                <ma14:wrappingTextBoxFlag xmlns="" xmlns:ma14="http://schemas.microsoft.com/office/mac/drawingml/2011/main" val="1"/>
               </a:ext>
             </a:extLst>
           </p:spPr>
@@ -7139,7 +7143,7 @@
             </a:ln>
             <a:extLst>
               <a:ext uri="{C572A759-6A51-4108-AA02-DFA0A04FC94B}">
-                <ma14:wrappingTextBoxFlag xmlns:ma14="http://schemas.microsoft.com/office/mac/drawingml/2011/main" xmlns="" val="1"/>
+                <ma14:wrappingTextBoxFlag xmlns="" xmlns:ma14="http://schemas.microsoft.com/office/mac/drawingml/2011/main" val="1"/>
               </a:ext>
             </a:extLst>
           </p:spPr>
@@ -7857,7 +7861,7 @@
             </a:ln>
             <a:extLst>
               <a:ext uri="{C572A759-6A51-4108-AA02-DFA0A04FC94B}">
-                <ma14:wrappingTextBoxFlag xmlns:ma14="http://schemas.microsoft.com/office/mac/drawingml/2011/main" xmlns="" val="1"/>
+                <ma14:wrappingTextBoxFlag xmlns="" xmlns:ma14="http://schemas.microsoft.com/office/mac/drawingml/2011/main" val="1"/>
               </a:ext>
             </a:extLst>
           </p:spPr>
@@ -8023,7 +8027,7 @@
             </a:ln>
             <a:extLst>
               <a:ext uri="{C572A759-6A51-4108-AA02-DFA0A04FC94B}">
-                <ma14:wrappingTextBoxFlag xmlns:ma14="http://schemas.microsoft.com/office/mac/drawingml/2011/main" xmlns="" val="1"/>
+                <ma14:wrappingTextBoxFlag xmlns="" xmlns:ma14="http://schemas.microsoft.com/office/mac/drawingml/2011/main" val="1"/>
               </a:ext>
             </a:extLst>
           </p:spPr>
@@ -8062,7 +8066,7 @@
           </a:ln>
           <a:extLst>
             <a:ext uri="{C572A759-6A51-4108-AA02-DFA0A04FC94B}">
-              <ma14:wrappingTextBoxFlag xmlns:ma14="http://schemas.microsoft.com/office/mac/drawingml/2011/main" xmlns="" val="1"/>
+              <ma14:wrappingTextBoxFlag xmlns="" xmlns:ma14="http://schemas.microsoft.com/office/mac/drawingml/2011/main" val="1"/>
             </a:ext>
           </a:extLst>
         </p:spPr>
@@ -8591,7 +8595,7 @@
             </a:ln>
             <a:extLst>
               <a:ext uri="{C572A759-6A51-4108-AA02-DFA0A04FC94B}">
-                <ma14:wrappingTextBoxFlag xmlns:ma14="http://schemas.microsoft.com/office/mac/drawingml/2011/main" xmlns="" val="1"/>
+                <ma14:wrappingTextBoxFlag xmlns="" xmlns:ma14="http://schemas.microsoft.com/office/mac/drawingml/2011/main" val="1"/>
               </a:ext>
             </a:extLst>
           </p:spPr>
@@ -8947,7 +8951,7 @@
               </a:ln>
               <a:extLst>
                 <a:ext uri="{C572A759-6A51-4108-AA02-DFA0A04FC94B}">
-                  <ma14:wrappingTextBoxFlag xmlns:ma14="http://schemas.microsoft.com/office/mac/drawingml/2011/main" xmlns="" val="1"/>
+                  <ma14:wrappingTextBoxFlag xmlns="" xmlns:ma14="http://schemas.microsoft.com/office/mac/drawingml/2011/main" val="1"/>
                 </a:ext>
               </a:extLst>
             </p:spPr>
@@ -9263,7 +9267,7 @@
           </a:ln>
           <a:extLst>
             <a:ext uri="{C572A759-6A51-4108-AA02-DFA0A04FC94B}">
-              <ma14:wrappingTextBoxFlag xmlns:ma14="http://schemas.microsoft.com/office/mac/drawingml/2011/main" xmlns="" val="1"/>
+              <ma14:wrappingTextBoxFlag xmlns="" xmlns:ma14="http://schemas.microsoft.com/office/mac/drawingml/2011/main" val="1"/>
             </a:ext>
           </a:extLst>
         </p:spPr>
@@ -9357,7 +9361,7 @@
           </a:ln>
           <a:extLst>
             <a:ext uri="{C572A759-6A51-4108-AA02-DFA0A04FC94B}">
-              <ma14:wrappingTextBoxFlag xmlns:ma14="http://schemas.microsoft.com/office/mac/drawingml/2011/main" xmlns="" val="1"/>
+              <ma14:wrappingTextBoxFlag xmlns="" xmlns:ma14="http://schemas.microsoft.com/office/mac/drawingml/2011/main" val="1"/>
             </a:ext>
           </a:extLst>
         </p:spPr>
@@ -9784,7 +9788,7 @@
           </a:ln>
           <a:extLst>
             <a:ext uri="{C572A759-6A51-4108-AA02-DFA0A04FC94B}">
-              <ma14:wrappingTextBoxFlag xmlns:ma14="http://schemas.microsoft.com/office/mac/drawingml/2011/main" xmlns="" val="1"/>
+              <ma14:wrappingTextBoxFlag xmlns="" xmlns:ma14="http://schemas.microsoft.com/office/mac/drawingml/2011/main" val="1"/>
             </a:ext>
           </a:extLst>
         </p:spPr>
@@ -9836,7 +9840,7 @@
           </a:ln>
           <a:extLst>
             <a:ext uri="{C572A759-6A51-4108-AA02-DFA0A04FC94B}">
-              <ma14:wrappingTextBoxFlag xmlns:ma14="http://schemas.microsoft.com/office/mac/drawingml/2011/main" xmlns="" val="1"/>
+              <ma14:wrappingTextBoxFlag xmlns="" xmlns:ma14="http://schemas.microsoft.com/office/mac/drawingml/2011/main" val="1"/>
             </a:ext>
           </a:extLst>
         </p:spPr>
@@ -10144,7 +10148,7 @@
         </p:nvSpPr>
         <p:spPr>
           <a:xfrm>
-            <a:off x="31091852" y="27173194"/>
+            <a:off x="31091852" y="24428982"/>
             <a:ext cx="3276000" cy="2430000"/>
           </a:xfrm>
           <a:prstGeom prst="roundRect">
@@ -10814,7 +10818,7 @@
           </a:ln>
           <a:extLst>
             <a:ext uri="{C572A759-6A51-4108-AA02-DFA0A04FC94B}">
-              <ma14:wrappingTextBoxFlag xmlns:ma14="http://schemas.microsoft.com/office/mac/drawingml/2011/main" xmlns="" val="1"/>
+              <ma14:wrappingTextBoxFlag xmlns="" xmlns:ma14="http://schemas.microsoft.com/office/mac/drawingml/2011/main" val="1"/>
             </a:ext>
           </a:extLst>
         </p:spPr>
@@ -11303,7 +11307,7 @@
           </a:ln>
           <a:extLst>
             <a:ext uri="{C572A759-6A51-4108-AA02-DFA0A04FC94B}">
-              <ma14:wrappingTextBoxFlag xmlns:ma14="http://schemas.microsoft.com/office/mac/drawingml/2011/main" xmlns="" val="1"/>
+              <ma14:wrappingTextBoxFlag xmlns="" xmlns:ma14="http://schemas.microsoft.com/office/mac/drawingml/2011/main" val="1"/>
             </a:ext>
           </a:extLst>
         </p:spPr>

</xml_diff>

<commit_message>
changing block of Foundations of cognitive modelling adding block numbers for increased readability
</commit_message>
<xml_diff>
--- a/MoLOverviewPoster2019.pptx
+++ b/MoLOverviewPoster2019.pptx
@@ -193,7 +193,7 @@
           <a:p>
             <a:fld id="{B179243D-0E3E-4D4F-90E9-F9F1DBB34143}" type="datetimeFigureOut">
               <a:rPr lang="en-US" smtClean="0"/>
-              <a:t>5/22/19</a:t>
+              <a:t>6/20/19</a:t>
             </a:fld>
             <a:endParaRPr lang="en-US"/>
           </a:p>
@@ -2319,7 +2319,7 @@
           </a:ln>
           <a:extLst>
             <a:ext uri="{C572A759-6A51-4108-AA02-DFA0A04FC94B}">
-              <ma14:wrappingTextBoxFlag xmlns:ma14="http://schemas.microsoft.com/office/mac/drawingml/2011/main" xmlns="" val="1"/>
+              <ma14:wrappingTextBoxFlag xmlns="" xmlns:ma14="http://schemas.microsoft.com/office/mac/drawingml/2011/main" val="1"/>
             </a:ext>
           </a:extLst>
         </p:spPr>
@@ -2362,7 +2362,7 @@
           </a:ln>
           <a:extLst>
             <a:ext uri="{C572A759-6A51-4108-AA02-DFA0A04FC94B}">
-              <ma14:wrappingTextBoxFlag xmlns:ma14="http://schemas.microsoft.com/office/mac/drawingml/2011/main" xmlns="" val="1"/>
+              <ma14:wrappingTextBoxFlag xmlns="" xmlns:ma14="http://schemas.microsoft.com/office/mac/drawingml/2011/main" val="1"/>
             </a:ext>
           </a:extLst>
         </p:spPr>
@@ -3296,7 +3296,7 @@
                     <a:srgbClr val="FFFFFF"/>
                   </a:solidFill>
                 </a:rPr>
-                <a:t>Sep/</a:t>
+                <a:t>1: Sep/</a:t>
               </a:r>
               <a:r>
                 <a:rPr lang="de-DE" sz="2900" dirty="0" err="1">
@@ -3372,6 +3372,10 @@
                 <a:defRPr sz="1800"/>
               </a:pPr>
               <a:r>
+                <a:rPr lang="fr-FR" sz="2900" dirty="0"/>
+                <a:t>2: </a:t>
+              </a:r>
+              <a:r>
                 <a:rPr lang="fr-FR" sz="2900" dirty="0" err="1"/>
                 <a:t>Nov</a:t>
               </a:r>
@@ -3446,7 +3450,7 @@
               </a:pPr>
               <a:r>
                 <a:rPr lang="en-US" sz="2900" dirty="0"/>
-                <a:t>Feb/Mar 2020</a:t>
+                <a:t>4: Feb/Mar 2020</a:t>
               </a:r>
             </a:p>
           </p:txBody>
@@ -3507,7 +3511,7 @@
               </a:pPr>
               <a:r>
                 <a:rPr lang="en-US" sz="2900" dirty="0"/>
-                <a:t>Apr/May 2020</a:t>
+                <a:t>5: Apr/May 2020</a:t>
               </a:r>
             </a:p>
           </p:txBody>
@@ -3582,7 +3586,7 @@
           </a:ln>
           <a:extLst>
             <a:ext uri="{C572A759-6A51-4108-AA02-DFA0A04FC94B}">
-              <ma14:wrappingTextBoxFlag xmlns:ma14="http://schemas.microsoft.com/office/mac/drawingml/2011/main" xmlns="" val="1"/>
+              <ma14:wrappingTextBoxFlag xmlns="" xmlns:ma14="http://schemas.microsoft.com/office/mac/drawingml/2011/main" val="1"/>
             </a:ext>
           </a:extLst>
         </p:spPr>
@@ -3697,7 +3701,7 @@
           </a:ln>
           <a:extLst>
             <a:ext uri="{C572A759-6A51-4108-AA02-DFA0A04FC94B}">
-              <ma14:wrappingTextBoxFlag xmlns:ma14="http://schemas.microsoft.com/office/mac/drawingml/2011/main" xmlns="" val="1"/>
+              <ma14:wrappingTextBoxFlag xmlns="" xmlns:ma14="http://schemas.microsoft.com/office/mac/drawingml/2011/main" val="1"/>
             </a:ext>
           </a:extLst>
         </p:spPr>
@@ -3803,7 +3807,7 @@
           </a:ln>
           <a:extLst>
             <a:ext uri="{C572A759-6A51-4108-AA02-DFA0A04FC94B}">
-              <ma14:wrappingTextBoxFlag xmlns:ma14="http://schemas.microsoft.com/office/mac/drawingml/2011/main" xmlns="" val="1"/>
+              <ma14:wrappingTextBoxFlag xmlns="" xmlns:ma14="http://schemas.microsoft.com/office/mac/drawingml/2011/main" val="1"/>
             </a:ext>
           </a:extLst>
         </p:spPr>
@@ -3863,7 +3867,7 @@
           </a:ln>
           <a:extLst>
             <a:ext uri="{C572A759-6A51-4108-AA02-DFA0A04FC94B}">
-              <ma14:wrappingTextBoxFlag xmlns:ma14="http://schemas.microsoft.com/office/mac/drawingml/2011/main" xmlns="" val="1"/>
+              <ma14:wrappingTextBoxFlag xmlns="" xmlns:ma14="http://schemas.microsoft.com/office/mac/drawingml/2011/main" val="1"/>
             </a:ext>
           </a:extLst>
         </p:spPr>
@@ -3958,7 +3962,7 @@
               </a:pPr>
               <a:r>
                 <a:rPr lang="en-US" sz="2900" dirty="0"/>
-                <a:t>[</a:t>
+                <a:t>2: [</a:t>
               </a:r>
               <a:r>
                 <a:rPr lang="en-US" sz="2900" dirty="0" err="1"/>
@@ -4033,7 +4037,7 @@
                   <a:ea typeface="Calibri" charset="0"/>
                   <a:cs typeface="Calibri" charset="0"/>
                 </a:rPr>
-                <a:t>[</a:t>
+                <a:t>4: [</a:t>
               </a:r>
               <a:r>
                 <a:rPr lang="en-US" sz="2900" dirty="0" err="1">
@@ -4141,7 +4145,7 @@
                       <a:srgbClr val="FFFFFF"/>
                     </a:solidFill>
                   </a:rPr>
-                  <a:t>[MoL-FNWI] Mathematical Proof Methods for Logic</a:t>
+                  <a:t>1: [MoL-FNWI] Mathematical Proof Methods for Logic</a:t>
                 </a:r>
                 <a:br>
                   <a:rPr lang="en-US" sz="2900" dirty="0">
@@ -4180,7 +4184,7 @@
               </a:ln>
               <a:extLst>
                 <a:ext uri="{C572A759-6A51-4108-AA02-DFA0A04FC94B}">
-                  <ma14:wrappingTextBoxFlag xmlns:ma14="http://schemas.microsoft.com/office/mac/drawingml/2011/main" xmlns="" val="1"/>
+                  <ma14:wrappingTextBoxFlag xmlns="" xmlns:ma14="http://schemas.microsoft.com/office/mac/drawingml/2011/main" val="1"/>
                 </a:ext>
               </a:extLst>
             </p:spPr>
@@ -4276,7 +4280,7 @@
           </a:ln>
           <a:extLst>
             <a:ext uri="{C572A759-6A51-4108-AA02-DFA0A04FC94B}">
-              <ma14:wrappingTextBoxFlag xmlns:ma14="http://schemas.microsoft.com/office/mac/drawingml/2011/main" xmlns="" val="1"/>
+              <ma14:wrappingTextBoxFlag xmlns="" xmlns:ma14="http://schemas.microsoft.com/office/mac/drawingml/2011/main" val="1"/>
             </a:ext>
           </a:extLst>
         </p:spPr>
@@ -4320,7 +4324,7 @@
           </a:ln>
           <a:extLst>
             <a:ext uri="{C572A759-6A51-4108-AA02-DFA0A04FC94B}">
-              <ma14:wrappingTextBoxFlag xmlns:ma14="http://schemas.microsoft.com/office/mac/drawingml/2011/main" xmlns="" val="1"/>
+              <ma14:wrappingTextBoxFlag xmlns="" xmlns:ma14="http://schemas.microsoft.com/office/mac/drawingml/2011/main" val="1"/>
             </a:ext>
           </a:extLst>
         </p:spPr>
@@ -4435,7 +4439,7 @@
                     <a:srgbClr val="FFFFFF"/>
                   </a:solidFill>
                 </a:rPr>
-                <a:t>Logic, Language and Computation (Aloni) </a:t>
+                <a:t>1+2: Logic, Language and Computation (Aloni) </a:t>
               </a:r>
               <a:br>
                 <a:rPr lang="en-US" sz="2900" dirty="0">
@@ -4476,7 +4480,7 @@
             </a:ln>
             <a:extLst>
               <a:ext uri="{C572A759-6A51-4108-AA02-DFA0A04FC94B}">
-                <ma14:wrappingTextBoxFlag xmlns:ma14="http://schemas.microsoft.com/office/mac/drawingml/2011/main" xmlns="" val="1"/>
+                <ma14:wrappingTextBoxFlag xmlns="" xmlns:ma14="http://schemas.microsoft.com/office/mac/drawingml/2011/main" val="1"/>
               </a:ext>
             </a:extLst>
           </p:spPr>
@@ -4529,7 +4533,7 @@
           </a:ln>
           <a:extLst>
             <a:ext uri="{C572A759-6A51-4108-AA02-DFA0A04FC94B}">
-              <ma14:wrappingTextBoxFlag xmlns:ma14="http://schemas.microsoft.com/office/mac/drawingml/2011/main" xmlns="" val="1"/>
+              <ma14:wrappingTextBoxFlag xmlns="" xmlns:ma14="http://schemas.microsoft.com/office/mac/drawingml/2011/main" val="1"/>
             </a:ext>
           </a:extLst>
         </p:spPr>
@@ -4688,7 +4692,7 @@
                 <a:latin typeface="Calibri" charset="0"/>
                 <a:cs typeface="Calibri" charset="0"/>
               </a:rPr>
-              <a:t>[</a:t>
+              <a:t>2:[</a:t>
             </a:r>
             <a:r>
               <a:rPr lang="en-US" sz="2900" dirty="0" err="1">
@@ -4776,7 +4780,7 @@
             </a:pPr>
             <a:r>
               <a:rPr lang="en-US" sz="2900" dirty="0"/>
-              <a:t>[</a:t>
+              <a:t>2: [</a:t>
             </a:r>
             <a:r>
               <a:rPr lang="en-US" sz="2900" dirty="0" err="1"/>
@@ -4820,71 +4824,96 @@
               <a:gd name="adj" fmla="val 16667"/>
             </a:avLst>
           </a:prstGeom>
-          <a:gradFill flip="none" rotWithShape="1">
-            <a:gsLst>
-              <a:gs pos="0">
-                <a:srgbClr val="DAFEA4"/>
-              </a:gs>
-              <a:gs pos="35000">
-                <a:srgbClr val="E4FDBF"/>
-              </a:gs>
-              <a:gs pos="100000">
-                <a:srgbClr val="F5FFE6"/>
-              </a:gs>
-            </a:gsLst>
-            <a:lin ang="16200000" scaled="0"/>
-          </a:gradFill>
-          <a:ln w="9525" cap="flat">
-            <a:solidFill>
-              <a:srgbClr val="98B955"/>
-            </a:solidFill>
-            <a:prstDash val="solid"/>
-            <a:bevel/>
-          </a:ln>
-          <a:effectLst>
-            <a:outerShdw blurRad="38100" dist="20000" dir="5400000" rotWithShape="0">
-              <a:srgbClr val="000000">
-                <a:alpha val="38000"/>
-              </a:srgbClr>
-            </a:outerShdw>
-          </a:effectLst>
+          <a:ln/>
         </p:spPr>
+        <p:style>
+          <a:lnRef idx="1">
+            <a:schemeClr val="accent4"/>
+          </a:lnRef>
+          <a:fillRef idx="2">
+            <a:schemeClr val="accent4"/>
+          </a:fillRef>
+          <a:effectRef idx="1">
+            <a:schemeClr val="accent4"/>
+          </a:effectRef>
+          <a:fontRef idx="minor">
+            <a:schemeClr val="dk1"/>
+          </a:fontRef>
+        </p:style>
         <p:txBody>
           <a:bodyPr wrap="square" lIns="0" tIns="0" rIns="0" bIns="0" numCol="1" anchor="ctr">
             <a:noAutofit/>
           </a:bodyPr>
           <a:lstStyle/>
           <a:p>
-            <a:pPr lvl="0" algn="ctr">
-              <a:defRPr sz="1800"/>
-            </a:pPr>
-            <a:r>
-              <a:rPr lang="en-US" sz="2900" dirty="0"/>
-              <a:t>[</a:t>
-            </a:r>
-            <a:r>
-              <a:rPr lang="en-US" sz="2900" dirty="0" err="1"/>
+            <a:pPr algn="ctr"/>
+            <a:r>
+              <a:rPr lang="en-US" sz="2900" dirty="0">
+                <a:solidFill>
+                  <a:schemeClr val="dk1"/>
+                </a:solidFill>
+                <a:latin typeface="+mn-lt"/>
+                <a:ea typeface="+mn-ea"/>
+                <a:cs typeface="+mn-cs"/>
+              </a:rPr>
+              <a:t>4: [</a:t>
+            </a:r>
+            <a:r>
+              <a:rPr lang="en-US" sz="2900" dirty="0" err="1">
+                <a:solidFill>
+                  <a:schemeClr val="dk1"/>
+                </a:solidFill>
+                <a:latin typeface="+mn-lt"/>
+                <a:ea typeface="+mn-ea"/>
+                <a:cs typeface="+mn-cs"/>
+              </a:rPr>
               <a:t>MScB&amp;CS</a:t>
             </a:r>
             <a:r>
-              <a:rPr lang="en-US" sz="2900" dirty="0"/>
+              <a:rPr lang="en-US" sz="2900" dirty="0">
+                <a:solidFill>
+                  <a:schemeClr val="dk1"/>
+                </a:solidFill>
+                <a:latin typeface="+mn-lt"/>
+                <a:ea typeface="+mn-ea"/>
+                <a:cs typeface="+mn-cs"/>
+              </a:rPr>
               <a:t>] Foundations of Neural and Cognitive Modelling </a:t>
             </a:r>
           </a:p>
           <a:p>
-            <a:pPr lvl="0" algn="ctr">
-              <a:defRPr sz="1800"/>
-            </a:pPr>
-            <a:r>
-              <a:rPr lang="en-US" sz="2900" dirty="0"/>
+            <a:pPr algn="ctr"/>
+            <a:r>
+              <a:rPr lang="en-US" sz="2900" dirty="0">
+                <a:solidFill>
+                  <a:schemeClr val="dk1"/>
+                </a:solidFill>
+                <a:latin typeface="+mn-lt"/>
+                <a:ea typeface="+mn-ea"/>
+                <a:cs typeface="+mn-cs"/>
+              </a:rPr>
               <a:t>(</a:t>
             </a:r>
             <a:r>
-              <a:rPr lang="en-US" sz="2900" dirty="0" err="1"/>
+              <a:rPr lang="en-US" sz="2900" dirty="0" err="1">
+                <a:solidFill>
+                  <a:schemeClr val="dk1"/>
+                </a:solidFill>
+                <a:latin typeface="+mn-lt"/>
+                <a:ea typeface="+mn-ea"/>
+                <a:cs typeface="+mn-cs"/>
+              </a:rPr>
               <a:t>Zuidema</a:t>
             </a:r>
             <a:r>
-              <a:rPr lang="en-US" sz="2900" dirty="0"/>
+              <a:rPr lang="en-US" sz="2900" dirty="0">
+                <a:solidFill>
+                  <a:schemeClr val="dk1"/>
+                </a:solidFill>
+                <a:latin typeface="+mn-lt"/>
+                <a:ea typeface="+mn-ea"/>
+                <a:cs typeface="+mn-cs"/>
+              </a:rPr>
               <a:t>)</a:t>
             </a:r>
           </a:p>
@@ -4947,7 +4976,7 @@
                 <a:latin typeface="Calibri"/>
                 <a:cs typeface="Calibri"/>
               </a:rPr>
-              <a:t>[</a:t>
+              <a:t>2: [</a:t>
             </a:r>
             <a:r>
               <a:rPr lang="en-US" sz="2900" dirty="0" err="1">
@@ -5036,7 +5065,7 @@
             </a:pPr>
             <a:r>
               <a:rPr lang="en-US" sz="2900" dirty="0"/>
-              <a:t>[</a:t>
+              <a:t>5: [</a:t>
             </a:r>
             <a:r>
               <a:rPr lang="en-US" sz="2900" dirty="0" err="1"/>
@@ -5113,7 +5142,7 @@
                 <a:latin typeface="Calibri"/>
                 <a:cs typeface="Calibri"/>
               </a:rPr>
-              <a:t>[</a:t>
+              <a:t>5: [</a:t>
             </a:r>
             <a:r>
               <a:rPr lang="en-US" sz="2900" dirty="0" err="1">
@@ -5193,7 +5222,7 @@
                 <a:ea typeface="+mn-ea"/>
                 <a:cs typeface="Calibri" charset="0"/>
               </a:rPr>
-              <a:t>[</a:t>
+              <a:t>1: [</a:t>
             </a:r>
             <a:r>
               <a:rPr lang="en-US" sz="2900" dirty="0" err="1">
@@ -5340,7 +5369,7 @@
             </a:pPr>
             <a:r>
               <a:rPr lang="en-US" sz="2900" dirty="0"/>
-              <a:t>[</a:t>
+              <a:t>5: [</a:t>
             </a:r>
             <a:r>
               <a:rPr lang="en-US" sz="2900" dirty="0" err="1"/>
@@ -5424,7 +5453,7 @@
             </a:pPr>
             <a:r>
               <a:rPr lang="en-US" sz="2900" dirty="0"/>
-              <a:t>[</a:t>
+              <a:t>2: [</a:t>
             </a:r>
             <a:r>
               <a:rPr lang="en-US" sz="2900" dirty="0" err="1"/>
@@ -5484,7 +5513,7 @@
                 <a:latin typeface="Calibri" charset="0"/>
                 <a:cs typeface="Calibri" charset="0"/>
               </a:rPr>
-              <a:t>[MoL-FGW] Rationality, Cognition and Reasoning </a:t>
+              <a:t>1: [MoL-FGW] Rationality, Cognition and Reasoning </a:t>
             </a:r>
             <a:br>
               <a:rPr lang="en-US" sz="2900" dirty="0">
@@ -5587,7 +5616,7 @@
                   <a:srgbClr val="FFFFFF"/>
                 </a:solidFill>
               </a:rPr>
-              <a:t>[</a:t>
+              <a:t>1: [</a:t>
             </a:r>
             <a:r>
               <a:rPr lang="en-US" sz="2900" dirty="0" err="1">
@@ -5664,7 +5693,7 @@
             </a:pPr>
             <a:r>
               <a:rPr lang="en-US" sz="2900" dirty="0"/>
-              <a:t>[</a:t>
+              <a:t>2: [</a:t>
             </a:r>
             <a:r>
               <a:rPr lang="en-US" sz="2900" dirty="0" err="1"/>
@@ -5686,15 +5715,7 @@
             </a:br>
             <a:r>
               <a:rPr lang="en-US" sz="2900" dirty="0"/>
-              <a:t>(</a:t>
-            </a:r>
-            <a:r>
-              <a:rPr lang="en-US" sz="2900" dirty="0" err="1"/>
-              <a:t>Brouwer</a:t>
-            </a:r>
-            <a:r>
-              <a:rPr lang="en-US" sz="2900" dirty="0"/>
-              <a:t>)</a:t>
+              <a:t>(Brouwer)</a:t>
             </a:r>
           </a:p>
         </p:txBody>
@@ -5746,7 +5767,7 @@
                 <a:latin typeface="Calibri" charset="0"/>
                 <a:cs typeface="Calibri" charset="0"/>
               </a:rPr>
-              <a:t>[</a:t>
+              <a:t>1: [</a:t>
             </a:r>
             <a:r>
               <a:rPr lang="en-US" sz="2900" dirty="0" err="1">
@@ -5865,7 +5886,7 @@
             </a:pPr>
             <a:r>
               <a:rPr lang="en-US" sz="2900" dirty="0"/>
-              <a:t>[</a:t>
+              <a:t>4: [</a:t>
             </a:r>
             <a:r>
               <a:rPr lang="en-US" sz="2900" dirty="0" err="1"/>
@@ -5950,7 +5971,7 @@
             </a:pPr>
             <a:r>
               <a:rPr lang="en-US" sz="2900" dirty="0"/>
-              <a:t>[</a:t>
+              <a:t>5: [</a:t>
             </a:r>
             <a:r>
               <a:rPr lang="en-US" sz="2900" dirty="0" err="1"/>
@@ -6039,7 +6060,7 @@
             <a:pPr algn="ctr"/>
             <a:r>
               <a:rPr lang="en-US" sz="2900" dirty="0"/>
-              <a:t>[</a:t>
+              <a:t>4: [</a:t>
             </a:r>
             <a:r>
               <a:rPr lang="en-US" sz="2900" dirty="0" err="1"/>
@@ -6128,7 +6149,7 @@
             <a:pPr algn="ctr"/>
             <a:r>
               <a:rPr lang="en-US" sz="2900" dirty="0"/>
-              <a:t>[</a:t>
+              <a:t>5: [</a:t>
             </a:r>
             <a:r>
               <a:rPr lang="en-US" sz="2900" dirty="0" err="1"/>
@@ -6204,7 +6225,7 @@
             </a:pPr>
             <a:r>
               <a:rPr lang="en-US" sz="2900" dirty="0"/>
-              <a:t>[</a:t>
+              <a:t>4: [</a:t>
             </a:r>
             <a:r>
               <a:rPr lang="en-US" sz="2900" dirty="0" err="1"/>
@@ -6264,7 +6285,7 @@
                 <a:latin typeface="Calibri" charset="0"/>
                 <a:cs typeface="Calibri" charset="0"/>
               </a:rPr>
-              <a:t>[</a:t>
+              <a:t>1:[</a:t>
             </a:r>
             <a:r>
               <a:rPr lang="en-US" sz="2900" dirty="0" err="1">
@@ -6384,7 +6405,7 @@
                   <a:srgbClr val="FFFFFF"/>
                 </a:solidFill>
               </a:rPr>
-              <a:t>[</a:t>
+              <a:t>1+2: [</a:t>
             </a:r>
             <a:r>
               <a:rPr lang="en-US" sz="2900" dirty="0" err="1">
@@ -6475,7 +6496,7 @@
             <a:pPr algn="ctr"/>
             <a:r>
               <a:rPr lang="en-US" sz="2900" dirty="0"/>
-              <a:t>[</a:t>
+              <a:t>2: [</a:t>
             </a:r>
             <a:r>
               <a:rPr lang="en-US" sz="2900" dirty="0" err="1"/>
@@ -6545,7 +6566,7 @@
                   <a:srgbClr val="FFFFFF"/>
                 </a:solidFill>
               </a:rPr>
-              <a:t>[</a:t>
+              <a:t>1+2: [</a:t>
             </a:r>
             <a:r>
               <a:rPr lang="en-US" sz="2900" dirty="0" err="1">
@@ -6639,11 +6660,11 @@
             </a:pPr>
             <a:r>
               <a:rPr lang="en-US" sz="2900" dirty="0"/>
-              <a:t>[</a:t>
+              <a:t>4+5: [</a:t>
             </a:r>
             <a:r>
               <a:rPr lang="en-US" sz="2900" dirty="0" err="1"/>
-              <a:t>MastMath-UvA</a:t>
+              <a:t>MMath-UvA</a:t>
             </a:r>
             <a:r>
               <a:rPr lang="en-US" sz="2900" dirty="0"/>
@@ -6851,11 +6872,11 @@
             <a:pPr algn="ctr"/>
             <a:r>
               <a:rPr lang="en-US" sz="2900" dirty="0"/>
-              <a:t>[</a:t>
+              <a:t>4+5: [</a:t>
             </a:r>
             <a:r>
               <a:rPr lang="en-US" sz="2900" dirty="0" err="1"/>
-              <a:t>MastMath-UvA</a:t>
+              <a:t>MMath-UvA</a:t>
             </a:r>
             <a:r>
               <a:rPr lang="en-US" sz="2900" dirty="0"/>
@@ -6969,7 +6990,7 @@
               </a:pPr>
               <a:r>
                 <a:rPr lang="en-US" sz="2900" dirty="0"/>
-                <a:t>[</a:t>
+                <a:t>2: [</a:t>
               </a:r>
               <a:r>
                 <a:rPr lang="en-US" sz="2900" dirty="0" err="1"/>
@@ -7001,7 +7022,7 @@
             </a:ln>
             <a:extLst>
               <a:ext uri="{C572A759-6A51-4108-AA02-DFA0A04FC94B}">
-                <ma14:wrappingTextBoxFlag xmlns:ma14="http://schemas.microsoft.com/office/mac/drawingml/2011/main" xmlns="" val="1"/>
+                <ma14:wrappingTextBoxFlag xmlns="" xmlns:ma14="http://schemas.microsoft.com/office/mac/drawingml/2011/main" val="1"/>
               </a:ext>
             </a:extLst>
           </p:spPr>
@@ -7113,7 +7134,7 @@
                   <a:ea typeface="Calibri" charset="0"/>
                   <a:cs typeface="Calibri" charset="0"/>
                 </a:rPr>
-                <a:t>[</a:t>
+                <a:t>4: [</a:t>
               </a:r>
               <a:r>
                 <a:rPr lang="en-US" sz="2900" dirty="0" err="1">
@@ -7201,7 +7222,7 @@
             </a:ln>
             <a:extLst>
               <a:ext uri="{C572A759-6A51-4108-AA02-DFA0A04FC94B}">
-                <ma14:wrappingTextBoxFlag xmlns:ma14="http://schemas.microsoft.com/office/mac/drawingml/2011/main" xmlns="" val="1"/>
+                <ma14:wrappingTextBoxFlag xmlns="" xmlns:ma14="http://schemas.microsoft.com/office/mac/drawingml/2011/main" val="1"/>
               </a:ext>
             </a:extLst>
           </p:spPr>
@@ -7278,7 +7299,7 @@
             </a:pPr>
             <a:r>
               <a:rPr lang="en-US" sz="2900" dirty="0"/>
-              <a:t>[</a:t>
+              <a:t>1: [</a:t>
             </a:r>
             <a:r>
               <a:rPr lang="en-US" sz="2900" dirty="0" err="1"/>
@@ -7367,7 +7388,7 @@
                   <a:srgbClr val="FFFFFF"/>
                 </a:solidFill>
               </a:rPr>
-              <a:t> [BScWisk] Introduction to Modal Logic (</a:t>
+              <a:t>1+2:  [BScWisk] Introduction to Modal Logic (</a:t>
             </a:r>
             <a:r>
               <a:rPr lang="en-US" sz="2900" dirty="0" err="1">
@@ -7435,7 +7456,7 @@
                 <a:latin typeface="Calibri" charset="0"/>
                 <a:cs typeface="Calibri" charset="0"/>
               </a:rPr>
-              <a:t>[</a:t>
+              <a:t>2: [</a:t>
             </a:r>
             <a:r>
               <a:rPr lang="en-US" sz="2900" dirty="0" err="1">
@@ -7674,7 +7695,7 @@
                   <a:srgbClr val="FFFFFF"/>
                 </a:solidFill>
               </a:rPr>
-              <a:t>[</a:t>
+              <a:t>1+2: [</a:t>
             </a:r>
             <a:r>
               <a:rPr lang="en-US" sz="2900" dirty="0" err="1">
@@ -7793,7 +7814,7 @@
             <a:pPr algn="ctr"/>
             <a:r>
               <a:rPr lang="en-US" sz="2900" dirty="0"/>
-              <a:t>[</a:t>
+              <a:t>4: [</a:t>
             </a:r>
             <a:r>
               <a:rPr lang="en-US" sz="2900" dirty="0" err="1"/>
@@ -7873,7 +7894,7 @@
               </a:pPr>
               <a:r>
                 <a:rPr lang="en-US" sz="2900" dirty="0"/>
-                <a:t>[</a:t>
+                <a:t>4: [</a:t>
               </a:r>
               <a:r>
                 <a:rPr lang="en-US" sz="2900" dirty="0" err="1"/>
@@ -7919,7 +7940,7 @@
             </a:ln>
             <a:extLst>
               <a:ext uri="{C572A759-6A51-4108-AA02-DFA0A04FC94B}">
-                <ma14:wrappingTextBoxFlag xmlns:ma14="http://schemas.microsoft.com/office/mac/drawingml/2011/main" xmlns="" val="1"/>
+                <ma14:wrappingTextBoxFlag xmlns="" xmlns:ma14="http://schemas.microsoft.com/office/mac/drawingml/2011/main" val="1"/>
               </a:ext>
             </a:extLst>
           </p:spPr>
@@ -8020,7 +8041,7 @@
               <a:pPr algn="ctr"/>
               <a:r>
                 <a:rPr lang="en-US" sz="2900" dirty="0"/>
-                <a:t>[</a:t>
+                <a:t>5: [</a:t>
               </a:r>
               <a:r>
                 <a:rPr lang="en-US" sz="2900" dirty="0" err="1"/>
@@ -8085,7 +8106,7 @@
             </a:ln>
             <a:extLst>
               <a:ext uri="{C572A759-6A51-4108-AA02-DFA0A04FC94B}">
-                <ma14:wrappingTextBoxFlag xmlns:ma14="http://schemas.microsoft.com/office/mac/drawingml/2011/main" xmlns="" val="1"/>
+                <ma14:wrappingTextBoxFlag xmlns="" xmlns:ma14="http://schemas.microsoft.com/office/mac/drawingml/2011/main" val="1"/>
               </a:ext>
             </a:extLst>
           </p:spPr>
@@ -8124,7 +8145,7 @@
           </a:ln>
           <a:extLst>
             <a:ext uri="{C572A759-6A51-4108-AA02-DFA0A04FC94B}">
-              <ma14:wrappingTextBoxFlag xmlns:ma14="http://schemas.microsoft.com/office/mac/drawingml/2011/main" xmlns="" val="1"/>
+              <ma14:wrappingTextBoxFlag xmlns="" xmlns:ma14="http://schemas.microsoft.com/office/mac/drawingml/2011/main" val="1"/>
             </a:ext>
           </a:extLst>
         </p:spPr>
@@ -8359,7 +8380,7 @@
                   <a:srgbClr val="FFFFFF"/>
                 </a:solidFill>
               </a:rPr>
-              <a:t>[</a:t>
+              <a:t>1+2: [</a:t>
             </a:r>
             <a:r>
               <a:rPr lang="en-US" sz="2900" dirty="0" err="1">
@@ -8473,7 +8494,7 @@
                 <a:ea typeface="Calibri" charset="0"/>
                 <a:cs typeface="Calibri" charset="0"/>
               </a:rPr>
-              <a:t>[</a:t>
+              <a:t>1: [</a:t>
             </a:r>
             <a:r>
               <a:rPr lang="en-US" sz="2900" dirty="0" err="1">
@@ -8584,7 +8605,7 @@
                   <a:ea typeface="Calibri" charset="0"/>
                   <a:cs typeface="Calibri" charset="0"/>
                 </a:rPr>
-                <a:t>[</a:t>
+                <a:t>5: [</a:t>
               </a:r>
               <a:r>
                 <a:rPr lang="en-US" sz="2900" dirty="0" err="1">
@@ -8653,7 +8674,7 @@
             </a:ln>
             <a:extLst>
               <a:ext uri="{C572A759-6A51-4108-AA02-DFA0A04FC94B}">
-                <ma14:wrappingTextBoxFlag xmlns:ma14="http://schemas.microsoft.com/office/mac/drawingml/2011/main" xmlns="" val="1"/>
+                <ma14:wrappingTextBoxFlag xmlns="" xmlns:ma14="http://schemas.microsoft.com/office/mac/drawingml/2011/main" val="1"/>
               </a:ext>
             </a:extLst>
           </p:spPr>
@@ -8758,6 +8779,17 @@
                   <a:cs typeface="Calibri" charset="0"/>
                 </a:rPr>
               </a:br>
+              <a:r>
+                <a:rPr lang="en-US" sz="2800" dirty="0">
+                  <a:solidFill>
+                    <a:srgbClr val="FFFFFF"/>
+                  </a:solidFill>
+                  <a:latin typeface="Calibri" charset="0"/>
+                  <a:ea typeface="Calibri" charset="0"/>
+                  <a:cs typeface="Calibri" charset="0"/>
+                </a:rPr>
+                <a:t>1: </a:t>
+              </a:r>
               <a:r>
                 <a:rPr lang="en-US" sz="2900" dirty="0">
                   <a:solidFill>
@@ -8871,7 +8903,7 @@
               </a:pPr>
               <a:r>
                 <a:rPr lang="en-US" sz="2900" dirty="0"/>
-                <a:t>[</a:t>
+                <a:t>5: [</a:t>
               </a:r>
               <a:r>
                 <a:rPr lang="en-US" sz="2900" dirty="0" err="1"/>
@@ -8969,7 +9001,7 @@
                 </a:pPr>
                 <a:r>
                   <a:rPr lang="en-US" sz="2900" dirty="0"/>
-                  <a:t>[</a:t>
+                  <a:t>2: [</a:t>
                 </a:r>
                 <a:r>
                   <a:rPr lang="en-US" sz="2900" dirty="0" err="1"/>
@@ -9009,7 +9041,7 @@
               </a:ln>
               <a:extLst>
                 <a:ext uri="{C572A759-6A51-4108-AA02-DFA0A04FC94B}">
-                  <ma14:wrappingTextBoxFlag xmlns:ma14="http://schemas.microsoft.com/office/mac/drawingml/2011/main" xmlns="" val="1"/>
+                  <ma14:wrappingTextBoxFlag xmlns="" xmlns:ma14="http://schemas.microsoft.com/office/mac/drawingml/2011/main" val="1"/>
                 </a:ext>
               </a:extLst>
             </p:spPr>
@@ -9091,7 +9123,7 @@
               </a:pPr>
               <a:r>
                 <a:rPr lang="en-US" sz="2900" dirty="0"/>
-                <a:t>[</a:t>
+                <a:t>4: [</a:t>
               </a:r>
               <a:r>
                 <a:rPr lang="en-US" sz="2900" dirty="0" err="1"/>
@@ -9180,7 +9212,7 @@
                   <a:schemeClr val="tx1"/>
                 </a:solidFill>
               </a:rPr>
-              <a:t>[RM-Ling] </a:t>
+              <a:t>4: [RM-Ling] </a:t>
             </a:r>
             <a:br>
               <a:rPr lang="en-US" sz="2900" dirty="0">
@@ -9213,18 +9245,21 @@
               <a:t>(</a:t>
             </a:r>
             <a:r>
-              <a:rPr lang="en-US" sz="2900">
+              <a:rPr lang="en-US" sz="2900" dirty="0" err="1">
                 <a:solidFill>
                   <a:schemeClr val="tx1"/>
                 </a:solidFill>
               </a:rPr>
-              <a:t>Ruijgrok)</a:t>
-            </a:r>
-            <a:endParaRPr lang="en-US" sz="2900" dirty="0">
-              <a:solidFill>
-                <a:schemeClr val="tx1"/>
-              </a:solidFill>
-            </a:endParaRPr>
+              <a:t>Ruijgrok</a:t>
+            </a:r>
+            <a:r>
+              <a:rPr lang="en-US" sz="2900" dirty="0">
+                <a:solidFill>
+                  <a:schemeClr val="tx1"/>
+                </a:solidFill>
+              </a:rPr>
+              <a:t>)</a:t>
+            </a:r>
           </a:p>
         </p:txBody>
       </p:sp>
@@ -9271,7 +9306,7 @@
             </a:pPr>
             <a:r>
               <a:rPr lang="en-US" sz="2900" dirty="0"/>
-              <a:t>[RM-Ling]</a:t>
+              <a:t>1: [RM-Ling]</a:t>
             </a:r>
             <a:br>
               <a:rPr lang="en-US" sz="2900" dirty="0"/>
@@ -9325,7 +9360,7 @@
           </a:ln>
           <a:extLst>
             <a:ext uri="{C572A759-6A51-4108-AA02-DFA0A04FC94B}">
-              <ma14:wrappingTextBoxFlag xmlns:ma14="http://schemas.microsoft.com/office/mac/drawingml/2011/main" xmlns="" val="1"/>
+              <ma14:wrappingTextBoxFlag xmlns="" xmlns:ma14="http://schemas.microsoft.com/office/mac/drawingml/2011/main" val="1"/>
             </a:ext>
           </a:extLst>
         </p:spPr>
@@ -9419,7 +9454,7 @@
           </a:ln>
           <a:extLst>
             <a:ext uri="{C572A759-6A51-4108-AA02-DFA0A04FC94B}">
-              <ma14:wrappingTextBoxFlag xmlns:ma14="http://schemas.microsoft.com/office/mac/drawingml/2011/main" xmlns="" val="1"/>
+              <ma14:wrappingTextBoxFlag xmlns="" xmlns:ma14="http://schemas.microsoft.com/office/mac/drawingml/2011/main" val="1"/>
             </a:ext>
           </a:extLst>
         </p:spPr>
@@ -9506,7 +9541,7 @@
                 <a:ea typeface="+mn-ea"/>
                 <a:cs typeface="+mn-cs"/>
               </a:rPr>
-              <a:t>[</a:t>
+              <a:t>4: [</a:t>
             </a:r>
             <a:r>
               <a:rPr lang="en-US" sz="2900" dirty="0" err="1">
@@ -9654,7 +9689,7 @@
                 <a:latin typeface="Calibri"/>
                 <a:cs typeface="Calibri"/>
               </a:rPr>
-              <a:t>[</a:t>
+              <a:t>5: [</a:t>
             </a:r>
             <a:r>
               <a:rPr lang="en-US" sz="2900" dirty="0" err="1">
@@ -9739,12 +9774,12 @@
           <a:p>
             <a:pPr algn="ctr"/>
             <a:r>
-              <a:rPr lang="en-US" sz="2900" dirty="0">
+              <a:rPr lang="en-US" sz="2900">
                 <a:solidFill>
                   <a:srgbClr val="FFFFFF"/>
                 </a:solidFill>
               </a:rPr>
-              <a:t>[</a:t>
+              <a:t>1+2: [</a:t>
             </a:r>
             <a:r>
               <a:rPr lang="en-US" sz="2900" dirty="0" err="1">
@@ -9846,7 +9881,7 @@
           </a:ln>
           <a:extLst>
             <a:ext uri="{C572A759-6A51-4108-AA02-DFA0A04FC94B}">
-              <ma14:wrappingTextBoxFlag xmlns:ma14="http://schemas.microsoft.com/office/mac/drawingml/2011/main" xmlns="" val="1"/>
+              <ma14:wrappingTextBoxFlag xmlns="" xmlns:ma14="http://schemas.microsoft.com/office/mac/drawingml/2011/main" val="1"/>
             </a:ext>
           </a:extLst>
         </p:spPr>
@@ -9898,7 +9933,7 @@
           </a:ln>
           <a:extLst>
             <a:ext uri="{C572A759-6A51-4108-AA02-DFA0A04FC94B}">
-              <ma14:wrappingTextBoxFlag xmlns:ma14="http://schemas.microsoft.com/office/mac/drawingml/2011/main" xmlns="" val="1"/>
+              <ma14:wrappingTextBoxFlag xmlns="" xmlns:ma14="http://schemas.microsoft.com/office/mac/drawingml/2011/main" val="1"/>
             </a:ext>
           </a:extLst>
         </p:spPr>
@@ -10069,7 +10104,7 @@
                 <a:ea typeface="+mn-ea"/>
                 <a:cs typeface="Calibri" charset="0"/>
               </a:rPr>
-              <a:t>[</a:t>
+              <a:t>1: [</a:t>
             </a:r>
             <a:r>
               <a:rPr lang="en-US" sz="2900" dirty="0" err="1">
@@ -10179,7 +10214,7 @@
             </a:pPr>
             <a:r>
               <a:rPr lang="en-US" sz="2900" dirty="0"/>
-              <a:t>[</a:t>
+              <a:t>5: [</a:t>
             </a:r>
             <a:r>
               <a:rPr lang="en-US" sz="2900" dirty="0" err="1"/>
@@ -10246,7 +10281,7 @@
                 <a:ea typeface="+mn-ea"/>
                 <a:cs typeface="+mn-cs"/>
               </a:rPr>
-              <a:t>[</a:t>
+              <a:t>4: [</a:t>
             </a:r>
             <a:r>
               <a:rPr lang="en-US" sz="2900" dirty="0" err="1">
@@ -10399,7 +10434,7 @@
             </a:pPr>
             <a:r>
               <a:rPr lang="en-US" sz="2900" dirty="0"/>
-              <a:t>[</a:t>
+              <a:t>4: [</a:t>
             </a:r>
             <a:r>
               <a:rPr lang="en-US" sz="2900" dirty="0" err="1"/>
@@ -10488,7 +10523,7 @@
             <a:pPr algn="ctr"/>
             <a:r>
               <a:rPr lang="en-US" sz="2900" dirty="0"/>
-              <a:t>[</a:t>
+              <a:t>4: [</a:t>
             </a:r>
             <a:r>
               <a:rPr lang="en-US" sz="2900" dirty="0" err="1"/>
@@ -10583,7 +10618,7 @@
             <a:pPr algn="ctr"/>
             <a:r>
               <a:rPr lang="en-US" sz="2900" dirty="0"/>
-              <a:t>[</a:t>
+              <a:t>4: [</a:t>
             </a:r>
             <a:r>
               <a:rPr lang="en-US" sz="2900" dirty="0" err="1"/>
@@ -10680,7 +10715,7 @@
             </a:pPr>
             <a:r>
               <a:rPr lang="en-US" sz="2900" dirty="0"/>
-              <a:t>[</a:t>
+              <a:t>5: [</a:t>
             </a:r>
             <a:r>
               <a:rPr lang="en-US" sz="2900" dirty="0" err="1"/>
@@ -10768,7 +10803,7 @@
             <a:pPr algn="ctr"/>
             <a:r>
               <a:rPr lang="en-US" sz="2900" dirty="0"/>
-              <a:t>[</a:t>
+              <a:t>2: [</a:t>
             </a:r>
             <a:r>
               <a:rPr lang="en-US" sz="2900" dirty="0" err="1"/>
@@ -10876,7 +10911,7 @@
           </a:ln>
           <a:extLst>
             <a:ext uri="{C572A759-6A51-4108-AA02-DFA0A04FC94B}">
-              <ma14:wrappingTextBoxFlag xmlns:ma14="http://schemas.microsoft.com/office/mac/drawingml/2011/main" xmlns="" val="1"/>
+              <ma14:wrappingTextBoxFlag xmlns="" xmlns:ma14="http://schemas.microsoft.com/office/mac/drawingml/2011/main" val="1"/>
             </a:ext>
           </a:extLst>
         </p:spPr>
@@ -11019,29 +11054,7 @@
                 <a:ea typeface="Calibri"/>
                 <a:cs typeface="Calibri"/>
               </a:rPr>
-              <a:t>version</a:t>
-            </a:r>
-            <a:r>
-              <a:rPr lang="en-US" sz="2800">
-                <a:solidFill>
-                  <a:sysClr val="windowText" lastClr="000000"/>
-                </a:solidFill>
-                <a:latin typeface="Calibri"/>
-                <a:ea typeface="Calibri"/>
-                <a:cs typeface="Calibri"/>
-              </a:rPr>
-              <a:t>: 22 </a:t>
-            </a:r>
-            <a:r>
-              <a:rPr lang="en-US" sz="2800" dirty="0">
-                <a:solidFill>
-                  <a:sysClr val="windowText" lastClr="000000"/>
-                </a:solidFill>
-                <a:latin typeface="Calibri"/>
-                <a:ea typeface="Calibri"/>
-                <a:cs typeface="Calibri"/>
-              </a:rPr>
-              <a:t>May 2019:</a:t>
+              <a:t>version: 20 June 2019:</a:t>
             </a:r>
             <a:br>
               <a:rPr lang="en-US" sz="2800" dirty="0">
@@ -11142,7 +11155,7 @@
                 <a:ea typeface="+mn-ea"/>
                 <a:cs typeface="Calibri" charset="0"/>
               </a:rPr>
-              <a:t>[</a:t>
+              <a:t>1: [</a:t>
             </a:r>
             <a:r>
               <a:rPr lang="en-US" sz="2900" dirty="0" err="1">
@@ -11286,7 +11299,7 @@
                   <a:srgbClr val="FFFFFF"/>
                 </a:solidFill>
               </a:rPr>
-              <a:t>[</a:t>
+              <a:t>1+2: [</a:t>
             </a:r>
             <a:r>
               <a:rPr lang="en-US" sz="2900" dirty="0" err="1">
@@ -11294,7 +11307,7 @@
                   <a:srgbClr val="FFFFFF"/>
                 </a:solidFill>
               </a:rPr>
-              <a:t>MastMath-UvA</a:t>
+              <a:t>MMath-UvA</a:t>
             </a:r>
             <a:r>
               <a:rPr lang="en-US" sz="2900" dirty="0">
@@ -11387,7 +11400,7 @@
           </a:ln>
           <a:extLst>
             <a:ext uri="{C572A759-6A51-4108-AA02-DFA0A04FC94B}">
-              <ma14:wrappingTextBoxFlag xmlns:ma14="http://schemas.microsoft.com/office/mac/drawingml/2011/main" xmlns="" val="1"/>
+              <ma14:wrappingTextBoxFlag xmlns="" xmlns:ma14="http://schemas.microsoft.com/office/mac/drawingml/2011/main" val="1"/>
             </a:ext>
           </a:extLst>
         </p:spPr>
@@ -11482,7 +11495,7 @@
             <a:pPr algn="ctr"/>
             <a:r>
               <a:rPr lang="nl" sz="2900" dirty="0"/>
-              <a:t>[MastMath] </a:t>
+              <a:t>4+5: [MastMath] </a:t>
             </a:r>
           </a:p>
           <a:p>
@@ -11574,7 +11587,7 @@
             </a:pPr>
             <a:r>
               <a:rPr lang="en-US" sz="2900" dirty="0"/>
-              <a:t>[</a:t>
+              <a:t>5: [</a:t>
             </a:r>
             <a:r>
               <a:rPr lang="en-US" sz="2900" dirty="0" err="1"/>
@@ -11657,7 +11670,7 @@
             </a:pPr>
             <a:r>
               <a:rPr lang="en-US" sz="2900" dirty="0"/>
-              <a:t>[</a:t>
+              <a:t>5: [</a:t>
             </a:r>
             <a:r>
               <a:rPr lang="en-US" sz="2900" dirty="0" err="1"/>
@@ -11855,7 +11868,7 @@
                 <a:latin typeface="Calibri"/>
                 <a:cs typeface="Calibri"/>
               </a:rPr>
-              <a:t>[</a:t>
+              <a:t>5: [</a:t>
             </a:r>
             <a:r>
               <a:rPr lang="en-US" sz="2900" dirty="0" err="1">
@@ -11967,7 +11980,7 @@
           </a:ln>
           <a:extLst>
             <a:ext uri="{C572A759-6A51-4108-AA02-DFA0A04FC94B}">
-              <ma14:wrappingTextBoxFlag xmlns:ma14="http://schemas.microsoft.com/office/mac/drawingml/2011/main" xmlns="" val="1"/>
+              <ma14:wrappingTextBoxFlag xmlns="" xmlns:ma14="http://schemas.microsoft.com/office/mac/drawingml/2011/main" val="1"/>
             </a:ext>
           </a:extLst>
         </p:spPr>

</xml_diff>

<commit_message>
Semantics and Philosophy in grey
</commit_message>
<xml_diff>
--- a/MoLOverviewPoster2019.pptx
+++ b/MoLOverviewPoster2019.pptx
@@ -193,7 +193,7 @@
           <a:p>
             <a:fld id="{B179243D-0E3E-4D4F-90E9-F9F1DBB34143}" type="datetimeFigureOut">
               <a:rPr lang="en-US" smtClean="0"/>
-              <a:t>6/20/19</a:t>
+              <a:t>8/29/19</a:t>
             </a:fld>
             <a:endParaRPr lang="en-US"/>
           </a:p>
@@ -2319,7 +2319,7 @@
           </a:ln>
           <a:extLst>
             <a:ext uri="{C572A759-6A51-4108-AA02-DFA0A04FC94B}">
-              <ma14:wrappingTextBoxFlag xmlns="" xmlns:ma14="http://schemas.microsoft.com/office/mac/drawingml/2011/main" val="1"/>
+              <ma14:wrappingTextBoxFlag xmlns:ma14="http://schemas.microsoft.com/office/mac/drawingml/2011/main" xmlns="" val="1"/>
             </a:ext>
           </a:extLst>
         </p:spPr>
@@ -2362,7 +2362,7 @@
           </a:ln>
           <a:extLst>
             <a:ext uri="{C572A759-6A51-4108-AA02-DFA0A04FC94B}">
-              <ma14:wrappingTextBoxFlag xmlns="" xmlns:ma14="http://schemas.microsoft.com/office/mac/drawingml/2011/main" val="1"/>
+              <ma14:wrappingTextBoxFlag xmlns:ma14="http://schemas.microsoft.com/office/mac/drawingml/2011/main" xmlns="" val="1"/>
             </a:ext>
           </a:extLst>
         </p:spPr>
@@ -3586,7 +3586,7 @@
           </a:ln>
           <a:extLst>
             <a:ext uri="{C572A759-6A51-4108-AA02-DFA0A04FC94B}">
-              <ma14:wrappingTextBoxFlag xmlns="" xmlns:ma14="http://schemas.microsoft.com/office/mac/drawingml/2011/main" val="1"/>
+              <ma14:wrappingTextBoxFlag xmlns:ma14="http://schemas.microsoft.com/office/mac/drawingml/2011/main" xmlns="" val="1"/>
             </a:ext>
           </a:extLst>
         </p:spPr>
@@ -3701,7 +3701,7 @@
           </a:ln>
           <a:extLst>
             <a:ext uri="{C572A759-6A51-4108-AA02-DFA0A04FC94B}">
-              <ma14:wrappingTextBoxFlag xmlns="" xmlns:ma14="http://schemas.microsoft.com/office/mac/drawingml/2011/main" val="1"/>
+              <ma14:wrappingTextBoxFlag xmlns:ma14="http://schemas.microsoft.com/office/mac/drawingml/2011/main" xmlns="" val="1"/>
             </a:ext>
           </a:extLst>
         </p:spPr>
@@ -3807,7 +3807,7 @@
           </a:ln>
           <a:extLst>
             <a:ext uri="{C572A759-6A51-4108-AA02-DFA0A04FC94B}">
-              <ma14:wrappingTextBoxFlag xmlns="" xmlns:ma14="http://schemas.microsoft.com/office/mac/drawingml/2011/main" val="1"/>
+              <ma14:wrappingTextBoxFlag xmlns:ma14="http://schemas.microsoft.com/office/mac/drawingml/2011/main" xmlns="" val="1"/>
             </a:ext>
           </a:extLst>
         </p:spPr>
@@ -3867,7 +3867,7 @@
           </a:ln>
           <a:extLst>
             <a:ext uri="{C572A759-6A51-4108-AA02-DFA0A04FC94B}">
-              <ma14:wrappingTextBoxFlag xmlns="" xmlns:ma14="http://schemas.microsoft.com/office/mac/drawingml/2011/main" val="1"/>
+              <ma14:wrappingTextBoxFlag xmlns:ma14="http://schemas.microsoft.com/office/mac/drawingml/2011/main" xmlns="" val="1"/>
             </a:ext>
           </a:extLst>
         </p:spPr>
@@ -4184,7 +4184,7 @@
               </a:ln>
               <a:extLst>
                 <a:ext uri="{C572A759-6A51-4108-AA02-DFA0A04FC94B}">
-                  <ma14:wrappingTextBoxFlag xmlns="" xmlns:ma14="http://schemas.microsoft.com/office/mac/drawingml/2011/main" val="1"/>
+                  <ma14:wrappingTextBoxFlag xmlns:ma14="http://schemas.microsoft.com/office/mac/drawingml/2011/main" xmlns="" val="1"/>
                 </a:ext>
               </a:extLst>
             </p:spPr>
@@ -4280,7 +4280,7 @@
           </a:ln>
           <a:extLst>
             <a:ext uri="{C572A759-6A51-4108-AA02-DFA0A04FC94B}">
-              <ma14:wrappingTextBoxFlag xmlns="" xmlns:ma14="http://schemas.microsoft.com/office/mac/drawingml/2011/main" val="1"/>
+              <ma14:wrappingTextBoxFlag xmlns:ma14="http://schemas.microsoft.com/office/mac/drawingml/2011/main" xmlns="" val="1"/>
             </a:ext>
           </a:extLst>
         </p:spPr>
@@ -4324,7 +4324,7 @@
           </a:ln>
           <a:extLst>
             <a:ext uri="{C572A759-6A51-4108-AA02-DFA0A04FC94B}">
-              <ma14:wrappingTextBoxFlag xmlns="" xmlns:ma14="http://schemas.microsoft.com/office/mac/drawingml/2011/main" val="1"/>
+              <ma14:wrappingTextBoxFlag xmlns:ma14="http://schemas.microsoft.com/office/mac/drawingml/2011/main" xmlns="" val="1"/>
             </a:ext>
           </a:extLst>
         </p:spPr>
@@ -4480,7 +4480,7 @@
             </a:ln>
             <a:extLst>
               <a:ext uri="{C572A759-6A51-4108-AA02-DFA0A04FC94B}">
-                <ma14:wrappingTextBoxFlag xmlns="" xmlns:ma14="http://schemas.microsoft.com/office/mac/drawingml/2011/main" val="1"/>
+                <ma14:wrappingTextBoxFlag xmlns:ma14="http://schemas.microsoft.com/office/mac/drawingml/2011/main" xmlns="" val="1"/>
               </a:ext>
             </a:extLst>
           </p:spPr>
@@ -4533,7 +4533,7 @@
           </a:ln>
           <a:extLst>
             <a:ext uri="{C572A759-6A51-4108-AA02-DFA0A04FC94B}">
-              <ma14:wrappingTextBoxFlag xmlns="" xmlns:ma14="http://schemas.microsoft.com/office/mac/drawingml/2011/main" val="1"/>
+              <ma14:wrappingTextBoxFlag xmlns:ma14="http://schemas.microsoft.com/office/mac/drawingml/2011/main" xmlns="" val="1"/>
             </a:ext>
           </a:extLst>
         </p:spPr>
@@ -6022,35 +6022,24 @@
               <a:gd name="adj" fmla="val 16667"/>
             </a:avLst>
           </a:prstGeom>
-          <a:gradFill flip="none" rotWithShape="1">
-            <a:gsLst>
-              <a:gs pos="0">
-                <a:srgbClr val="C8B2E9"/>
-              </a:gs>
-              <a:gs pos="35000">
-                <a:srgbClr val="D8C9EE"/>
-              </a:gs>
-              <a:gs pos="100000">
-                <a:srgbClr val="F0EAF9"/>
-              </a:gs>
-            </a:gsLst>
-            <a:lin ang="16200000" scaled="0"/>
-          </a:gradFill>
-          <a:ln w="9525" cap="flat">
-            <a:solidFill>
-              <a:srgbClr val="7D60A0"/>
-            </a:solidFill>
-            <a:prstDash val="solid"/>
-            <a:bevel/>
+          <a:ln>
+            <a:noFill/>
           </a:ln>
-          <a:effectLst>
-            <a:outerShdw blurRad="38100" dist="20000" dir="5400000" rotWithShape="0">
-              <a:srgbClr val="000000">
-                <a:alpha val="38000"/>
-              </a:srgbClr>
-            </a:outerShdw>
-          </a:effectLst>
         </p:spPr>
+        <p:style>
+          <a:lnRef idx="1">
+            <a:schemeClr val="dk1"/>
+          </a:lnRef>
+          <a:fillRef idx="2">
+            <a:schemeClr val="dk1"/>
+          </a:fillRef>
+          <a:effectRef idx="1">
+            <a:schemeClr val="dk1"/>
+          </a:effectRef>
+          <a:fontRef idx="minor">
+            <a:schemeClr val="dk1"/>
+          </a:fontRef>
+        </p:style>
         <p:txBody>
           <a:bodyPr wrap="square" lIns="0" tIns="0" rIns="0" bIns="0" numCol="1" anchor="ctr">
             <a:noAutofit/>
@@ -6059,37 +6048,118 @@
           <a:p>
             <a:pPr algn="ctr"/>
             <a:r>
-              <a:rPr lang="en-US" sz="2900" dirty="0"/>
-              <a:t>4: [</a:t>
-            </a:r>
-            <a:r>
-              <a:rPr lang="en-US" sz="2900" dirty="0" err="1"/>
+              <a:rPr lang="en-US" sz="2900" dirty="0">
+                <a:solidFill>
+                  <a:schemeClr val="dk1">
+                    <a:alpha val="25000"/>
+                  </a:schemeClr>
+                </a:solidFill>
+                <a:latin typeface="Calibri" charset="0"/>
+                <a:ea typeface="+mn-ea"/>
+                <a:cs typeface="Calibri" charset="0"/>
+              </a:rPr>
+              <a:t>[</a:t>
+            </a:r>
+            <a:r>
+              <a:rPr lang="en-US" sz="2900" dirty="0" err="1">
+                <a:solidFill>
+                  <a:schemeClr val="dk1">
+                    <a:alpha val="25000"/>
+                  </a:schemeClr>
+                </a:solidFill>
+                <a:latin typeface="Calibri" charset="0"/>
+                <a:ea typeface="+mn-ea"/>
+                <a:cs typeface="Calibri" charset="0"/>
+              </a:rPr>
               <a:t>MoL</a:t>
             </a:r>
             <a:r>
-              <a:rPr lang="en-US" sz="2900" dirty="0"/>
+              <a:rPr lang="en-US" sz="2900" dirty="0">
+                <a:solidFill>
+                  <a:schemeClr val="dk1">
+                    <a:alpha val="25000"/>
+                  </a:schemeClr>
+                </a:solidFill>
+                <a:latin typeface="Calibri" charset="0"/>
+                <a:ea typeface="+mn-ea"/>
+                <a:cs typeface="Calibri" charset="0"/>
+              </a:rPr>
               <a:t>-FGW] </a:t>
             </a:r>
             <a:br>
-              <a:rPr lang="en-US" sz="2900" dirty="0"/>
+              <a:rPr lang="en-US" sz="2900" dirty="0">
+                <a:solidFill>
+                  <a:schemeClr val="dk1">
+                    <a:alpha val="25000"/>
+                  </a:schemeClr>
+                </a:solidFill>
+                <a:latin typeface="Calibri" charset="0"/>
+                <a:ea typeface="+mn-ea"/>
+                <a:cs typeface="Calibri" charset="0"/>
+              </a:rPr>
             </a:br>
             <a:r>
-              <a:rPr lang="en-US" sz="2900" dirty="0"/>
+              <a:rPr lang="en-US" sz="2900" dirty="0">
+                <a:solidFill>
+                  <a:schemeClr val="dk1">
+                    <a:alpha val="25000"/>
+                  </a:schemeClr>
+                </a:solidFill>
+                <a:latin typeface="Calibri" charset="0"/>
+                <a:ea typeface="+mn-ea"/>
+                <a:cs typeface="Calibri" charset="0"/>
+              </a:rPr>
               <a:t>Semantics and Philosophy</a:t>
             </a:r>
             <a:br>
-              <a:rPr lang="en-US" sz="2900" dirty="0"/>
+              <a:rPr lang="en-US" sz="2900" dirty="0">
+                <a:solidFill>
+                  <a:schemeClr val="dk1">
+                    <a:alpha val="25000"/>
+                  </a:schemeClr>
+                </a:solidFill>
+                <a:latin typeface="Calibri" charset="0"/>
+                <a:ea typeface="+mn-ea"/>
+                <a:cs typeface="Calibri" charset="0"/>
+              </a:rPr>
             </a:br>
             <a:r>
-              <a:rPr lang="en-US" sz="2900" dirty="0"/>
+              <a:rPr lang="en-US" sz="2900" dirty="0">
+                <a:solidFill>
+                  <a:schemeClr val="dk1">
+                    <a:alpha val="25000"/>
+                  </a:schemeClr>
+                </a:solidFill>
+                <a:latin typeface="Calibri" charset="0"/>
+                <a:ea typeface="+mn-ea"/>
+                <a:cs typeface="Calibri" charset="0"/>
+              </a:rPr>
               <a:t>(Dekker, </a:t>
             </a:r>
             <a:r>
-              <a:rPr lang="en-US" sz="2900" dirty="0" err="1"/>
+              <a:rPr lang="en-US" sz="2900" dirty="0" err="1">
+                <a:solidFill>
+                  <a:schemeClr val="dk1">
+                    <a:alpha val="25000"/>
+                  </a:schemeClr>
+                </a:solidFill>
+                <a:latin typeface="Calibri" charset="0"/>
+                <a:ea typeface="+mn-ea"/>
+                <a:cs typeface="Calibri" charset="0"/>
+              </a:rPr>
               <a:t>Aloni</a:t>
             </a:r>
             <a:r>
-              <a:rPr lang="en-US" sz="2900" dirty="0"/>
+              <a:rPr lang="en-US" sz="2900" dirty="0">
+                <a:solidFill>
+                  <a:schemeClr val="dk1">
+                    <a:alpha val="25000"/>
+                  </a:schemeClr>
+                </a:solidFill>
+                <a:latin typeface="Calibri" charset="0"/>
+                <a:ea typeface="+mn-ea"/>
+                <a:cs typeface="Calibri" charset="0"/>
+              </a:rPr>
               <a:t>)</a:t>
             </a:r>
           </a:p>
@@ -7022,7 +7092,7 @@
             </a:ln>
             <a:extLst>
               <a:ext uri="{C572A759-6A51-4108-AA02-DFA0A04FC94B}">
-                <ma14:wrappingTextBoxFlag xmlns="" xmlns:ma14="http://schemas.microsoft.com/office/mac/drawingml/2011/main" val="1"/>
+                <ma14:wrappingTextBoxFlag xmlns:ma14="http://schemas.microsoft.com/office/mac/drawingml/2011/main" xmlns="" val="1"/>
               </a:ext>
             </a:extLst>
           </p:spPr>
@@ -7222,7 +7292,7 @@
             </a:ln>
             <a:extLst>
               <a:ext uri="{C572A759-6A51-4108-AA02-DFA0A04FC94B}">
-                <ma14:wrappingTextBoxFlag xmlns="" xmlns:ma14="http://schemas.microsoft.com/office/mac/drawingml/2011/main" val="1"/>
+                <ma14:wrappingTextBoxFlag xmlns:ma14="http://schemas.microsoft.com/office/mac/drawingml/2011/main" xmlns="" val="1"/>
               </a:ext>
             </a:extLst>
           </p:spPr>
@@ -7940,7 +8010,7 @@
             </a:ln>
             <a:extLst>
               <a:ext uri="{C572A759-6A51-4108-AA02-DFA0A04FC94B}">
-                <ma14:wrappingTextBoxFlag xmlns="" xmlns:ma14="http://schemas.microsoft.com/office/mac/drawingml/2011/main" val="1"/>
+                <ma14:wrappingTextBoxFlag xmlns:ma14="http://schemas.microsoft.com/office/mac/drawingml/2011/main" xmlns="" val="1"/>
               </a:ext>
             </a:extLst>
           </p:spPr>
@@ -8106,7 +8176,7 @@
             </a:ln>
             <a:extLst>
               <a:ext uri="{C572A759-6A51-4108-AA02-DFA0A04FC94B}">
-                <ma14:wrappingTextBoxFlag xmlns="" xmlns:ma14="http://schemas.microsoft.com/office/mac/drawingml/2011/main" val="1"/>
+                <ma14:wrappingTextBoxFlag xmlns:ma14="http://schemas.microsoft.com/office/mac/drawingml/2011/main" xmlns="" val="1"/>
               </a:ext>
             </a:extLst>
           </p:spPr>
@@ -8145,7 +8215,7 @@
           </a:ln>
           <a:extLst>
             <a:ext uri="{C572A759-6A51-4108-AA02-DFA0A04FC94B}">
-              <ma14:wrappingTextBoxFlag xmlns="" xmlns:ma14="http://schemas.microsoft.com/office/mac/drawingml/2011/main" val="1"/>
+              <ma14:wrappingTextBoxFlag xmlns:ma14="http://schemas.microsoft.com/office/mac/drawingml/2011/main" xmlns="" val="1"/>
             </a:ext>
           </a:extLst>
         </p:spPr>
@@ -8674,7 +8744,7 @@
             </a:ln>
             <a:extLst>
               <a:ext uri="{C572A759-6A51-4108-AA02-DFA0A04FC94B}">
-                <ma14:wrappingTextBoxFlag xmlns="" xmlns:ma14="http://schemas.microsoft.com/office/mac/drawingml/2011/main" val="1"/>
+                <ma14:wrappingTextBoxFlag xmlns:ma14="http://schemas.microsoft.com/office/mac/drawingml/2011/main" xmlns="" val="1"/>
               </a:ext>
             </a:extLst>
           </p:spPr>
@@ -9041,7 +9111,7 @@
               </a:ln>
               <a:extLst>
                 <a:ext uri="{C572A759-6A51-4108-AA02-DFA0A04FC94B}">
-                  <ma14:wrappingTextBoxFlag xmlns="" xmlns:ma14="http://schemas.microsoft.com/office/mac/drawingml/2011/main" val="1"/>
+                  <ma14:wrappingTextBoxFlag xmlns:ma14="http://schemas.microsoft.com/office/mac/drawingml/2011/main" xmlns="" val="1"/>
                 </a:ext>
               </a:extLst>
             </p:spPr>
@@ -9360,7 +9430,7 @@
           </a:ln>
           <a:extLst>
             <a:ext uri="{C572A759-6A51-4108-AA02-DFA0A04FC94B}">
-              <ma14:wrappingTextBoxFlag xmlns="" xmlns:ma14="http://schemas.microsoft.com/office/mac/drawingml/2011/main" val="1"/>
+              <ma14:wrappingTextBoxFlag xmlns:ma14="http://schemas.microsoft.com/office/mac/drawingml/2011/main" xmlns="" val="1"/>
             </a:ext>
           </a:extLst>
         </p:spPr>
@@ -9454,7 +9524,7 @@
           </a:ln>
           <a:extLst>
             <a:ext uri="{C572A759-6A51-4108-AA02-DFA0A04FC94B}">
-              <ma14:wrappingTextBoxFlag xmlns="" xmlns:ma14="http://schemas.microsoft.com/office/mac/drawingml/2011/main" val="1"/>
+              <ma14:wrappingTextBoxFlag xmlns:ma14="http://schemas.microsoft.com/office/mac/drawingml/2011/main" xmlns="" val="1"/>
             </a:ext>
           </a:extLst>
         </p:spPr>
@@ -9881,7 +9951,7 @@
           </a:ln>
           <a:extLst>
             <a:ext uri="{C572A759-6A51-4108-AA02-DFA0A04FC94B}">
-              <ma14:wrappingTextBoxFlag xmlns="" xmlns:ma14="http://schemas.microsoft.com/office/mac/drawingml/2011/main" val="1"/>
+              <ma14:wrappingTextBoxFlag xmlns:ma14="http://schemas.microsoft.com/office/mac/drawingml/2011/main" xmlns="" val="1"/>
             </a:ext>
           </a:extLst>
         </p:spPr>
@@ -9933,7 +10003,7 @@
           </a:ln>
           <a:extLst>
             <a:ext uri="{C572A759-6A51-4108-AA02-DFA0A04FC94B}">
-              <ma14:wrappingTextBoxFlag xmlns="" xmlns:ma14="http://schemas.microsoft.com/office/mac/drawingml/2011/main" val="1"/>
+              <ma14:wrappingTextBoxFlag xmlns:ma14="http://schemas.microsoft.com/office/mac/drawingml/2011/main" xmlns="" val="1"/>
             </a:ext>
           </a:extLst>
         </p:spPr>
@@ -10911,7 +10981,7 @@
           </a:ln>
           <a:extLst>
             <a:ext uri="{C572A759-6A51-4108-AA02-DFA0A04FC94B}">
-              <ma14:wrappingTextBoxFlag xmlns="" xmlns:ma14="http://schemas.microsoft.com/office/mac/drawingml/2011/main" val="1"/>
+              <ma14:wrappingTextBoxFlag xmlns:ma14="http://schemas.microsoft.com/office/mac/drawingml/2011/main" xmlns="" val="1"/>
             </a:ext>
           </a:extLst>
         </p:spPr>
@@ -11054,7 +11124,7 @@
                 <a:ea typeface="Calibri"/>
                 <a:cs typeface="Calibri"/>
               </a:rPr>
-              <a:t>version: 20 June 2019:</a:t>
+              <a:t>version: 29 August 2019:</a:t>
             </a:r>
             <a:br>
               <a:rPr lang="en-US" sz="2800" dirty="0">
@@ -11400,7 +11470,7 @@
           </a:ln>
           <a:extLst>
             <a:ext uri="{C572A759-6A51-4108-AA02-DFA0A04FC94B}">
-              <ma14:wrappingTextBoxFlag xmlns="" xmlns:ma14="http://schemas.microsoft.com/office/mac/drawingml/2011/main" val="1"/>
+              <ma14:wrappingTextBoxFlag xmlns:ma14="http://schemas.microsoft.com/office/mac/drawingml/2011/main" xmlns="" val="1"/>
             </a:ext>
           </a:extLst>
         </p:spPr>
@@ -11980,7 +12050,7 @@
           </a:ln>
           <a:extLst>
             <a:ext uri="{C572A759-6A51-4108-AA02-DFA0A04FC94B}">
-              <ma14:wrappingTextBoxFlag xmlns="" xmlns:ma14="http://schemas.microsoft.com/office/mac/drawingml/2011/main" val="1"/>
+              <ma14:wrappingTextBoxFlag xmlns:ma14="http://schemas.microsoft.com/office/mac/drawingml/2011/main" xmlns="" val="1"/>
             </a:ext>
           </a:extLst>
         </p:spPr>

</xml_diff>